<commit_message>
Ajuste ppt aula 01
</commit_message>
<xml_diff>
--- a/01 Classes/Aulas 01 e 02 Conceitos Eng. Soft e Métodos Ágeis.pptx
+++ b/01 Classes/Aulas 01 e 02 Conceitos Eng. Soft e Métodos Ágeis.pptx
@@ -12,14 +12,14 @@
     <p:sldId id="291" r:id="rId3"/>
     <p:sldId id="293" r:id="rId4"/>
     <p:sldId id="294" r:id="rId5"/>
-    <p:sldId id="295" r:id="rId6"/>
-    <p:sldId id="296" r:id="rId7"/>
-    <p:sldId id="297" r:id="rId8"/>
-    <p:sldId id="298" r:id="rId9"/>
-    <p:sldId id="299" r:id="rId10"/>
-    <p:sldId id="300" r:id="rId11"/>
-    <p:sldId id="302" r:id="rId12"/>
-    <p:sldId id="303" r:id="rId13"/>
+    <p:sldId id="302" r:id="rId6"/>
+    <p:sldId id="303" r:id="rId7"/>
+    <p:sldId id="295" r:id="rId8"/>
+    <p:sldId id="296" r:id="rId9"/>
+    <p:sldId id="297" r:id="rId10"/>
+    <p:sldId id="298" r:id="rId11"/>
+    <p:sldId id="299" r:id="rId12"/>
+    <p:sldId id="300" r:id="rId13"/>
     <p:sldId id="304" r:id="rId14"/>
     <p:sldId id="305" r:id="rId15"/>
     <p:sldId id="306" r:id="rId16"/>
@@ -2946,7 +2946,7 @@
           </a:ln>
           <a:extLst>
             <a:ext uri="{C572A759-6A51-4108-AA02-DFA0A04FC94B}">
-              <ma14:wrappingTextBoxFlag xmlns:ma14="http://schemas.microsoft.com/office/mac/drawingml/2011/main" xmlns="" val="1"/>
+              <ma14:wrappingTextBoxFlag xmlns="" xmlns:ma14="http://schemas.microsoft.com/office/mac/drawingml/2011/main" val="1"/>
             </a:ext>
           </a:extLst>
         </p:spPr>
@@ -2985,7 +2985,7 @@
           </a:ln>
           <a:extLst>
             <a:ext uri="{C572A759-6A51-4108-AA02-DFA0A04FC94B}">
-              <ma14:wrappingTextBoxFlag xmlns:ma14="http://schemas.microsoft.com/office/mac/drawingml/2011/main" xmlns="" val="1"/>
+              <ma14:wrappingTextBoxFlag xmlns="" xmlns:ma14="http://schemas.microsoft.com/office/mac/drawingml/2011/main" val="1"/>
             </a:ext>
           </a:extLst>
         </p:spPr>
@@ -4124,7 +4124,7 @@
           </a:ln>
           <a:extLst>
             <a:ext uri="{C572A759-6A51-4108-AA02-DFA0A04FC94B}">
-              <ma14:wrappingTextBoxFlag xmlns:ma14="http://schemas.microsoft.com/office/mac/drawingml/2011/main" xmlns="" val="1"/>
+              <ma14:wrappingTextBoxFlag xmlns="" xmlns:ma14="http://schemas.microsoft.com/office/mac/drawingml/2011/main" val="1"/>
             </a:ext>
           </a:extLst>
         </p:spPr>
@@ -4482,7 +4482,7 @@
                   <a:srgbClr val="0070C0"/>
                 </a:solidFill>
               </a:rPr>
-              <a:t>Conceitos</a:t>
+              <a:t>Definição</a:t>
             </a:r>
             <a:r>
               <a:rPr lang="en-US" b="1" dirty="0">
@@ -4490,23 +4490,7 @@
                   <a:srgbClr val="0070C0"/>
                 </a:solidFill>
               </a:rPr>
-              <a:t> </a:t>
-            </a:r>
-            <a:r>
-              <a:rPr lang="en-US" b="1" dirty="0" err="1">
-                <a:solidFill>
-                  <a:srgbClr val="0070C0"/>
-                </a:solidFill>
-              </a:rPr>
-              <a:t>em</a:t>
-            </a:r>
-            <a:r>
-              <a:rPr lang="en-US" b="1" dirty="0">
-                <a:solidFill>
-                  <a:srgbClr val="0070C0"/>
-                </a:solidFill>
-              </a:rPr>
-              <a:t> Eng. De Software</a:t>
+              <a:t> De Software</a:t>
             </a:r>
           </a:p>
         </p:txBody>
@@ -4545,136 +4529,87 @@
             </a:pPr>
             <a:r>
               <a:rPr lang="pt-BR" b="1" i="1" dirty="0"/>
+              <a:t>Computação ubíqua</a:t>
+            </a:r>
+            <a:r>
+              <a:rPr lang="pt-BR" b="1" dirty="0"/>
+              <a:t>. </a:t>
+            </a:r>
+            <a:r>
+              <a:rPr lang="pt-BR" dirty="0"/>
+              <a:t>Também chamada de </a:t>
+            </a:r>
+            <a:r>
+              <a:rPr lang="pt-BR" b="1" dirty="0" err="1">
+                <a:solidFill>
+                  <a:srgbClr val="FF0000"/>
+                </a:solidFill>
+              </a:rPr>
+              <a:t>Ubicomp</a:t>
+            </a:r>
+            <a:r>
+              <a:rPr lang="pt-BR" dirty="0"/>
+              <a:t> e </a:t>
+            </a:r>
+            <a:r>
+              <a:rPr lang="pt-BR" b="1" dirty="0">
+                <a:solidFill>
+                  <a:srgbClr val="FF0000"/>
+                </a:solidFill>
+              </a:rPr>
+              <a:t>computação pervasiva</a:t>
+            </a:r>
+            <a:r>
+              <a:rPr lang="pt-BR" dirty="0"/>
+              <a:t>, é um termo utilizado para definir a integração das tecnologias no cotidiano humano de forma onipresente, ou seja, a presença natural da tecnologia no cotidiano das pessoas.</a:t>
+            </a:r>
+          </a:p>
+          <a:p>
+            <a:pPr marL="0" indent="0" algn="just">
+              <a:buNone/>
+            </a:pPr>
+            <a:r>
+              <a:rPr lang="pt-BR" dirty="0"/>
+              <a:t> </a:t>
+            </a:r>
+            <a:r>
+              <a:rPr lang="pt-BR" b="1" dirty="0"/>
+              <a:t> </a:t>
+            </a:r>
+            <a:endParaRPr lang="pt-BR" dirty="0"/>
+          </a:p>
+          <a:p>
+            <a:pPr algn="just">
+              <a:buFont typeface="Wingdings" pitchFamily="2" charset="2"/>
+              <a:buChar char="q"/>
+            </a:pPr>
+            <a:r>
+              <a:rPr lang="pt-BR" b="1" i="1" dirty="0"/>
               <a:t>Software</a:t>
             </a:r>
             <a:r>
               <a:rPr lang="pt-BR" b="1" dirty="0"/>
-              <a:t> Legado</a:t>
+              <a:t> aberto. </a:t>
             </a:r>
             <a:r>
               <a:rPr lang="pt-BR" dirty="0"/>
-              <a:t>. Ferramentas que apoiam a migração de sistemas legados para a nuvem:</a:t>
-            </a:r>
-          </a:p>
-          <a:p>
-            <a:pPr marL="514350" indent="-514350" algn="just">
-              <a:buAutoNum type="arabicPeriod"/>
-            </a:pPr>
-            <a:endParaRPr lang="pt-BR" dirty="0"/>
-          </a:p>
-          <a:p>
-            <a:pPr marL="514350" indent="-514350" algn="just">
-              <a:buAutoNum type="arabicPeriod"/>
-            </a:pPr>
-            <a:r>
-              <a:rPr lang="pt-BR" dirty="0" err="1"/>
-              <a:t>MoDisco</a:t>
+              <a:t>São </a:t>
+            </a:r>
+            <a:r>
+              <a:rPr lang="pt-BR" i="1" dirty="0"/>
+              <a:t>software</a:t>
             </a:r>
             <a:r>
               <a:rPr lang="pt-BR" dirty="0"/>
-              <a:t> [KDM] (</a:t>
-            </a:r>
-            <a:r>
-              <a:rPr lang="pt-BR" dirty="0" err="1"/>
-              <a:t>Plugin</a:t>
+              <a:t> que disponibiliza a visualização do código fonte da aplicação para o engenheiro de </a:t>
+            </a:r>
+            <a:r>
+              <a:rPr lang="pt-BR" i="1" dirty="0"/>
+              <a:t>software</a:t>
             </a:r>
             <a:r>
               <a:rPr lang="pt-BR" dirty="0"/>
-              <a:t> do Eclipse)</a:t>
-            </a:r>
-          </a:p>
-          <a:p>
-            <a:pPr marL="514350" indent="-514350" algn="just">
-              <a:buAutoNum type="arabicPeriod"/>
-            </a:pPr>
-            <a:r>
-              <a:rPr lang="pt-BR" dirty="0" err="1"/>
-              <a:t>CloudMig</a:t>
-            </a:r>
-            <a:r>
-              <a:rPr lang="pt-BR" dirty="0"/>
-              <a:t> </a:t>
-            </a:r>
-            <a:r>
-              <a:rPr lang="pt-BR" dirty="0" err="1"/>
-              <a:t>Xpress</a:t>
-            </a:r>
-            <a:r>
-              <a:rPr lang="pt-BR" dirty="0"/>
-              <a:t> (</a:t>
-            </a:r>
-            <a:r>
-              <a:rPr lang="pt-BR" dirty="0">
-                <a:hlinkClick r:id="rId2"/>
-              </a:rPr>
-              <a:t>sourceforge.net</a:t>
-            </a:r>
-            <a:r>
-              <a:rPr lang="pt-BR" dirty="0"/>
-              <a:t>)</a:t>
-            </a:r>
-          </a:p>
-          <a:p>
-            <a:pPr marL="514350" indent="-514350" algn="just">
-              <a:buAutoNum type="arabicPeriod"/>
-            </a:pPr>
-            <a:r>
-              <a:rPr lang="pt-BR" dirty="0" err="1"/>
-              <a:t>OpenTOSCA</a:t>
-            </a:r>
-            <a:r>
-              <a:rPr lang="pt-BR" dirty="0"/>
-              <a:t> (Padrão TOSCA, OASIS) (</a:t>
-            </a:r>
-            <a:r>
-              <a:rPr lang="pt-BR" dirty="0">
-                <a:hlinkClick r:id="rId3"/>
-              </a:rPr>
-              <a:t>opentosca.org</a:t>
-            </a:r>
-            <a:r>
-              <a:rPr lang="pt-BR" dirty="0"/>
-              <a:t>)</a:t>
-            </a:r>
-          </a:p>
-          <a:p>
-            <a:pPr marL="514350" indent="-514350" algn="just">
-              <a:buAutoNum type="arabicPeriod"/>
-            </a:pPr>
-            <a:r>
-              <a:rPr lang="pt-BR" dirty="0" err="1"/>
-              <a:t>Cloudify</a:t>
-            </a:r>
-            <a:r>
-              <a:rPr lang="pt-BR" dirty="0"/>
-              <a:t> (</a:t>
-            </a:r>
-            <a:r>
-              <a:rPr lang="pt-BR" dirty="0">
-                <a:hlinkClick r:id="rId4"/>
-              </a:rPr>
-              <a:t>https://getcloudify.org/</a:t>
-            </a:r>
-            <a:r>
-              <a:rPr lang="pt-BR" dirty="0"/>
-              <a:t>)</a:t>
-            </a:r>
-          </a:p>
-          <a:p>
-            <a:pPr marL="514350" indent="-514350" algn="just">
-              <a:buAutoNum type="arabicPeriod"/>
-            </a:pPr>
-            <a:r>
-              <a:rPr lang="pt-BR" dirty="0"/>
-              <a:t>DDD (Domain </a:t>
-            </a:r>
-            <a:r>
-              <a:rPr lang="pt-BR" dirty="0" err="1"/>
-              <a:t>Driven</a:t>
-            </a:r>
-            <a:r>
-              <a:rPr lang="pt-BR" dirty="0"/>
-              <a:t> Design), projeto orientado a domínio</a:t>
+              <a:t> modifica da maneira que deseja;</a:t>
             </a:r>
           </a:p>
         </p:txBody>
@@ -4682,7 +4617,7 @@
     </p:spTree>
     <p:extLst>
       <p:ext uri="{BB962C8B-B14F-4D97-AF65-F5344CB8AC3E}">
-        <p14:creationId xmlns:p14="http://schemas.microsoft.com/office/powerpoint/2010/main" val="3964213842"/>
+        <p14:creationId xmlns:p14="http://schemas.microsoft.com/office/powerpoint/2010/main" val="3472221676"/>
       </p:ext>
     </p:extLst>
   </p:cSld>
@@ -4742,7 +4677,7 @@
                   <a:srgbClr val="0070C0"/>
                 </a:solidFill>
               </a:rPr>
-              <a:t>Conceitos</a:t>
+              <a:t>Definição</a:t>
             </a:r>
             <a:r>
               <a:rPr lang="en-US" b="1" dirty="0">
@@ -4750,23 +4685,7 @@
                   <a:srgbClr val="0070C0"/>
                 </a:solidFill>
               </a:rPr>
-              <a:t> </a:t>
-            </a:r>
-            <a:r>
-              <a:rPr lang="en-US" b="1" dirty="0" err="1">
-                <a:solidFill>
-                  <a:srgbClr val="0070C0"/>
-                </a:solidFill>
-              </a:rPr>
-              <a:t>em</a:t>
-            </a:r>
-            <a:r>
-              <a:rPr lang="en-US" b="1" dirty="0">
-                <a:solidFill>
-                  <a:srgbClr val="0070C0"/>
-                </a:solidFill>
-              </a:rPr>
-              <a:t> Eng. De Software</a:t>
+              <a:t> De Software</a:t>
             </a:r>
           </a:p>
         </p:txBody>
@@ -4795,151 +4714,80 @@
         </p:spPr>
         <p:txBody>
           <a:bodyPr>
-            <a:noAutofit/>
+            <a:normAutofit fontScale="92500"/>
           </a:bodyPr>
           <a:lstStyle/>
+          <a:p>
+            <a:pPr algn="just">
+              <a:buFont typeface="Wingdings" pitchFamily="2" charset="2"/>
+              <a:buChar char="q"/>
+            </a:pPr>
+            <a:r>
+              <a:rPr lang="pt-BR" b="1" i="1" dirty="0"/>
+              <a:t>Software</a:t>
+            </a:r>
+            <a:r>
+              <a:rPr lang="pt-BR" b="1" dirty="0"/>
+              <a:t> Legado</a:t>
+            </a:r>
+            <a:r>
+              <a:rPr lang="pt-BR" dirty="0"/>
+              <a:t>. O nome de </a:t>
+            </a:r>
+            <a:r>
+              <a:rPr lang="pt-BR" i="1" dirty="0"/>
+              <a:t>software</a:t>
+            </a:r>
+            <a:r>
+              <a:rPr lang="pt-BR" dirty="0"/>
+              <a:t> legado é dado quando refere há um programa de computador que foi desenvolvido por há muito tempo. </a:t>
+            </a:r>
+          </a:p>
+          <a:p>
+            <a:pPr algn="just">
+              <a:buFont typeface="Wingdings" pitchFamily="2" charset="2"/>
+              <a:buChar char="q"/>
+            </a:pPr>
+            <a:endParaRPr lang="pt-BR" dirty="0"/>
+          </a:p>
           <a:p>
             <a:pPr marL="0" indent="0" algn="just">
               <a:buNone/>
             </a:pPr>
             <a:r>
-              <a:rPr lang="pt-BR" sz="2200" b="1" dirty="0"/>
-              <a:t>	Engenharia de </a:t>
-            </a:r>
-            <a:r>
-              <a:rPr lang="pt-BR" sz="2200" b="1" i="1" dirty="0"/>
-              <a:t>software</a:t>
-            </a:r>
-            <a:r>
-              <a:rPr lang="pt-BR" sz="2200" dirty="0"/>
-              <a:t> é uma abordagem sistemática e disciplinada para o desenvolvimento de </a:t>
-            </a:r>
-            <a:r>
-              <a:rPr lang="pt-BR" sz="2200" i="1" dirty="0"/>
-              <a:t>software</a:t>
-            </a:r>
-            <a:r>
-              <a:rPr lang="pt-BR" sz="2200" dirty="0"/>
-              <a:t> (PRESSMAN, 2006).</a:t>
+              <a:rPr lang="pt-BR" dirty="0"/>
+              <a:t>Um problema, quando não existem documentações e se existem são pobres de detalhes, os casos de teste, podem ser pobres, quando tem e sem um controle de mudanças. </a:t>
             </a:r>
           </a:p>
           <a:p>
             <a:pPr marL="0" indent="0" algn="just">
               <a:buNone/>
             </a:pPr>
-            <a:r>
-              <a:rPr lang="pt-BR" sz="2200" dirty="0"/>
-              <a:t>Uma das grandes dificuldades da engenharia do </a:t>
-            </a:r>
-            <a:r>
-              <a:rPr lang="pt-BR" sz="2200" i="1" dirty="0"/>
-              <a:t>software</a:t>
-            </a:r>
-            <a:r>
-              <a:rPr lang="pt-BR" sz="2200" dirty="0"/>
-              <a:t> é resolver o problema e deixar o cliente satisfeito com o </a:t>
-            </a:r>
-            <a:r>
-              <a:rPr lang="pt-BR" sz="2200" i="1" dirty="0"/>
-              <a:t>software</a:t>
-            </a:r>
-            <a:r>
-              <a:rPr lang="pt-BR" sz="2200" dirty="0"/>
-              <a:t> (JALOTE, 2005).</a:t>
-            </a:r>
+            <a:endParaRPr lang="pt-BR" dirty="0"/>
           </a:p>
           <a:p>
             <a:pPr marL="0" indent="0" algn="just">
               <a:buNone/>
             </a:pPr>
-            <a:endParaRPr lang="pt-BR" sz="2200" dirty="0"/>
-          </a:p>
-          <a:p>
-            <a:pPr marL="0" indent="0" algn="just">
-              <a:buNone/>
-            </a:pPr>
-            <a:r>
-              <a:rPr lang="pt-BR" sz="2200" dirty="0"/>
-              <a:t>	A </a:t>
-            </a:r>
-            <a:r>
-              <a:rPr lang="pt-BR" sz="2200" b="1" dirty="0"/>
-              <a:t>engenharia de </a:t>
-            </a:r>
-            <a:r>
-              <a:rPr lang="pt-BR" sz="2200" b="1" i="1" dirty="0"/>
+            <a:r>
+              <a:rPr lang="pt-BR" dirty="0"/>
+              <a:t>E muitas vezes não mexem no </a:t>
+            </a:r>
+            <a:r>
+              <a:rPr lang="pt-BR" i="1" dirty="0"/>
               <a:t>software</a:t>
             </a:r>
             <a:r>
-              <a:rPr lang="pt-BR" sz="2200" dirty="0"/>
-              <a:t> foca no </a:t>
-            </a:r>
-            <a:r>
-              <a:rPr lang="pt-BR" sz="2200" i="1" dirty="0"/>
-              <a:t>software</a:t>
-            </a:r>
-            <a:r>
-              <a:rPr lang="pt-BR" sz="2200" dirty="0"/>
-              <a:t> como produto. Não entra neste escopo o </a:t>
-            </a:r>
-            <a:r>
-              <a:rPr lang="pt-BR" sz="2200" i="1" dirty="0"/>
-              <a:t>softwares</a:t>
-            </a:r>
-            <a:r>
-              <a:rPr lang="pt-BR" sz="2200" dirty="0"/>
-              <a:t> construídos apenas para passarem o tempo dos programadores (PAULA FILHO, 2009).</a:t>
-            </a:r>
-          </a:p>
-          <a:p>
-            <a:pPr marL="0" indent="0" algn="just">
-              <a:buNone/>
-            </a:pPr>
-            <a:endParaRPr lang="pt-BR" sz="2200" dirty="0"/>
-          </a:p>
-          <a:p>
-            <a:pPr marL="0" indent="0" algn="just">
-              <a:buNone/>
-            </a:pPr>
-            <a:r>
-              <a:rPr lang="pt-BR" sz="2200" dirty="0"/>
-              <a:t>	No </a:t>
-            </a:r>
-            <a:r>
-              <a:rPr lang="pt-BR" sz="2200" b="1" dirty="0"/>
-              <a:t>desenvolvimento de um projeto de </a:t>
-            </a:r>
-            <a:r>
-              <a:rPr lang="pt-BR" sz="2200" b="1" i="1" dirty="0"/>
-              <a:t>software</a:t>
-            </a:r>
-            <a:r>
-              <a:rPr lang="pt-BR" sz="2200" dirty="0"/>
-              <a:t> quanto mais complexo é o </a:t>
-            </a:r>
-            <a:r>
-              <a:rPr lang="pt-BR" sz="2200" i="1" dirty="0"/>
-              <a:t>software</a:t>
-            </a:r>
-            <a:r>
-              <a:rPr lang="pt-BR" sz="2200" dirty="0"/>
-              <a:t>, maior é o empenho que o engenheiro de </a:t>
-            </a:r>
-            <a:r>
-              <a:rPr lang="pt-BR" sz="2200" i="1" dirty="0"/>
-              <a:t>software</a:t>
-            </a:r>
-            <a:r>
-              <a:rPr lang="pt-BR" sz="2200" dirty="0"/>
-              <a:t> deve fazer para desenvolver e tem que ter maior gerenciamento</a:t>
-            </a:r>
-            <a:r>
-              <a:rPr lang="pt-BR" sz="2200" b="1" dirty="0"/>
-              <a:t> </a:t>
-            </a:r>
-            <a:r>
-              <a:rPr lang="pt-BR" sz="2200" dirty="0"/>
-              <a:t>(JALOTE, 2005).</a:t>
+              <a:rPr lang="pt-BR" dirty="0"/>
+              <a:t> legado quando eles atentem as necessidades do cliente (</a:t>
+            </a:r>
+            <a:r>
+              <a:rPr lang="pt-BR" b="1" dirty="0"/>
+              <a:t>PRESSMAN, 2006</a:t>
+            </a:r>
+            <a:r>
+              <a:rPr lang="pt-BR" dirty="0"/>
+              <a:t>).</a:t>
             </a:r>
           </a:p>
         </p:txBody>
@@ -4947,7 +4795,7 @@
     </p:spTree>
     <p:extLst>
       <p:ext uri="{BB962C8B-B14F-4D97-AF65-F5344CB8AC3E}">
-        <p14:creationId xmlns:p14="http://schemas.microsoft.com/office/powerpoint/2010/main" val="2986393598"/>
+        <p14:creationId xmlns:p14="http://schemas.microsoft.com/office/powerpoint/2010/main" val="1478780828"/>
       </p:ext>
     </p:extLst>
   </p:cSld>
@@ -5007,7 +4855,7 @@
                   <a:srgbClr val="0070C0"/>
                 </a:solidFill>
               </a:rPr>
-              <a:t>Conceitos</a:t>
+              <a:t>Definição</a:t>
             </a:r>
             <a:r>
               <a:rPr lang="en-US" b="1" dirty="0">
@@ -5015,23 +4863,7 @@
                   <a:srgbClr val="0070C0"/>
                 </a:solidFill>
               </a:rPr>
-              <a:t> </a:t>
-            </a:r>
-            <a:r>
-              <a:rPr lang="en-US" b="1" dirty="0" err="1">
-                <a:solidFill>
-                  <a:srgbClr val="0070C0"/>
-                </a:solidFill>
-              </a:rPr>
-              <a:t>em</a:t>
-            </a:r>
-            <a:r>
-              <a:rPr lang="en-US" b="1" dirty="0">
-                <a:solidFill>
-                  <a:srgbClr val="0070C0"/>
-                </a:solidFill>
-              </a:rPr>
-              <a:t> Eng. De Software</a:t>
+              <a:t> De Software</a:t>
             </a:r>
           </a:p>
         </p:txBody>
@@ -5060,183 +4892,146 @@
         </p:spPr>
         <p:txBody>
           <a:bodyPr>
-            <a:noAutofit/>
+            <a:normAutofit/>
           </a:bodyPr>
           <a:lstStyle/>
           <a:p>
-            <a:pPr marL="0" indent="0" algn="just">
-              <a:buNone/>
+            <a:pPr algn="just">
+              <a:buFont typeface="Wingdings" pitchFamily="2" charset="2"/>
+              <a:buChar char="q"/>
             </a:pPr>
             <a:r>
-              <a:rPr lang="pt-BR" sz="1800" b="1" dirty="0"/>
-              <a:t>	Engenharia de </a:t>
-            </a:r>
-            <a:r>
-              <a:rPr lang="pt-BR" sz="1800" b="1" i="1" dirty="0"/>
-              <a:t>software</a:t>
-            </a:r>
-            <a:r>
-              <a:rPr lang="pt-BR" sz="1800" dirty="0"/>
-              <a:t> são conjuntos de atividades para o processo de desenvolvimento de </a:t>
-            </a:r>
-            <a:r>
-              <a:rPr lang="pt-BR" sz="1800" i="1" dirty="0"/>
-              <a:t>software</a:t>
-            </a:r>
-            <a:r>
-              <a:rPr lang="pt-BR" sz="1800" dirty="0"/>
-              <a:t>. A existência de vários tipos de processo de desenvolvimento de </a:t>
-            </a:r>
-            <a:r>
-              <a:rPr lang="pt-BR" sz="1800" i="1" dirty="0"/>
-              <a:t>software</a:t>
-            </a:r>
-            <a:r>
-              <a:rPr lang="pt-BR" sz="1800" dirty="0"/>
-              <a:t> e podemos dizer para resolver o problema do </a:t>
-            </a:r>
-            <a:r>
-              <a:rPr lang="pt-BR" sz="1800" i="1" dirty="0"/>
-              <a:t>software</a:t>
-            </a:r>
-            <a:r>
-              <a:rPr lang="pt-BR" sz="1800" dirty="0"/>
-              <a:t> usam estas atividades tais como: analise de requisito, design do </a:t>
-            </a:r>
-            <a:r>
-              <a:rPr lang="pt-BR" sz="1800" i="1" dirty="0"/>
-              <a:t>software</a:t>
-            </a:r>
-            <a:r>
-              <a:rPr lang="pt-BR" sz="1800" dirty="0"/>
-              <a:t>, código e teste (JALOTE, 2005).</a:t>
-            </a:r>
-          </a:p>
-          <a:p>
-            <a:pPr marL="0" indent="0" algn="just">
-              <a:buNone/>
+              <a:rPr lang="pt-BR" b="1" i="1" dirty="0"/>
+              <a:t>Software</a:t>
+            </a:r>
+            <a:r>
+              <a:rPr lang="pt-BR" b="1" dirty="0"/>
+              <a:t> Legado</a:t>
+            </a:r>
+            <a:r>
+              <a:rPr lang="pt-BR" dirty="0"/>
+              <a:t>. Ferramentas que apoiam a migração de sistemas legados para a nuvem:</a:t>
+            </a:r>
+          </a:p>
+          <a:p>
+            <a:pPr marL="514350" indent="-514350" algn="just">
+              <a:buAutoNum type="arabicPeriod"/>
             </a:pPr>
-            <a:endParaRPr lang="pt-BR" sz="1800" dirty="0"/>
-          </a:p>
-          <a:p>
-            <a:pPr algn="just"/>
-            <a:r>
-              <a:rPr lang="pt-BR" sz="1800" b="1" dirty="0"/>
-              <a:t>Analise de requisito. </a:t>
-            </a:r>
-            <a:r>
-              <a:rPr lang="pt-BR" sz="1800" dirty="0"/>
-              <a:t>Através da analise de requisito é o momento onde efetua o conhecimento do problema para desenvolve o </a:t>
-            </a:r>
-            <a:r>
-              <a:rPr lang="pt-BR" sz="1800" i="1" dirty="0"/>
-              <a:t>software</a:t>
-            </a:r>
-            <a:r>
-              <a:rPr lang="pt-BR" sz="1800" dirty="0"/>
-              <a:t> (JALOTE, 2005).</a:t>
-            </a:r>
-            <a:r>
-              <a:rPr lang="pt-BR" sz="1800" b="1" dirty="0"/>
-              <a:t> </a:t>
-            </a:r>
-            <a:endParaRPr lang="pt-BR" sz="1800" dirty="0"/>
-          </a:p>
-          <a:p>
-            <a:pPr algn="just"/>
-            <a:r>
-              <a:rPr lang="pt-BR" sz="1800" b="1" dirty="0"/>
-              <a:t>Design do </a:t>
-            </a:r>
-            <a:r>
-              <a:rPr lang="pt-BR" sz="1800" b="1" i="1" dirty="0"/>
-              <a:t>software</a:t>
-            </a:r>
-            <a:r>
-              <a:rPr lang="pt-BR" sz="1800" b="1" dirty="0"/>
-              <a:t>. </a:t>
-            </a:r>
-            <a:r>
-              <a:rPr lang="pt-BR" sz="1800" dirty="0"/>
-              <a:t>Pelo design do </a:t>
-            </a:r>
-            <a:r>
-              <a:rPr lang="pt-BR" sz="1800" i="1" dirty="0"/>
-              <a:t>software</a:t>
-            </a:r>
-            <a:r>
-              <a:rPr lang="pt-BR" sz="1800" dirty="0"/>
-              <a:t> é o momento que o engenheiro de </a:t>
-            </a:r>
-            <a:r>
-              <a:rPr lang="pt-BR" sz="1800" i="1" dirty="0"/>
-              <a:t>software</a:t>
-            </a:r>
-            <a:r>
-              <a:rPr lang="pt-BR" sz="1800" dirty="0"/>
-              <a:t> realiza o planejamento da solução do problema que foi levantado no documento de requisito (JALOTE, 2005). </a:t>
-            </a:r>
-          </a:p>
-          <a:p>
-            <a:pPr algn="just"/>
-            <a:r>
-              <a:rPr lang="pt-BR" sz="1800" b="1" dirty="0"/>
-              <a:t>Codificação. </a:t>
-            </a:r>
-            <a:r>
-              <a:rPr lang="pt-BR" sz="1800" dirty="0"/>
-              <a:t>A codificação é o momento que pega o problema resolvido no design do </a:t>
-            </a:r>
-            <a:r>
-              <a:rPr lang="pt-BR" sz="1800" i="1" dirty="0"/>
-              <a:t>software</a:t>
-            </a:r>
-            <a:r>
-              <a:rPr lang="pt-BR" sz="1800" dirty="0"/>
-              <a:t> e transformará em uma linguagem de programação (JALOTE, 2005). </a:t>
-            </a:r>
-          </a:p>
-          <a:p>
-            <a:pPr algn="just"/>
-            <a:r>
-              <a:rPr lang="pt-BR" sz="1800" b="1" dirty="0"/>
-              <a:t>Teste. </a:t>
-            </a:r>
-            <a:r>
-              <a:rPr lang="pt-BR" sz="1800" dirty="0"/>
-              <a:t>O teste de </a:t>
-            </a:r>
-            <a:r>
-              <a:rPr lang="pt-BR" sz="1800" i="1" dirty="0"/>
-              <a:t>software</a:t>
-            </a:r>
-            <a:r>
-              <a:rPr lang="pt-BR" sz="1800" dirty="0"/>
-              <a:t> é o processo tem a intenção de encontrar defeitos nos artefatos de </a:t>
-            </a:r>
-            <a:r>
-              <a:rPr lang="pt-BR" sz="1800" i="1" dirty="0"/>
-              <a:t>software</a:t>
-            </a:r>
-            <a:r>
-              <a:rPr lang="pt-BR" sz="1800" dirty="0"/>
-              <a:t> (MYERS, 2004). O teste é uma maneira de medir o controle da qualidade do </a:t>
-            </a:r>
-            <a:r>
-              <a:rPr lang="pt-BR" sz="1800" i="1" dirty="0"/>
-              <a:t>software</a:t>
-            </a:r>
-            <a:r>
-              <a:rPr lang="pt-BR" sz="1800" dirty="0"/>
-              <a:t> durante o desenvolvimento de </a:t>
-            </a:r>
-            <a:r>
-              <a:rPr lang="pt-BR" sz="1800" i="1" dirty="0"/>
-              <a:t>software</a:t>
-            </a:r>
-            <a:r>
-              <a:rPr lang="pt-BR" sz="1800" dirty="0"/>
-              <a:t> (JALOTE, 2005).</a:t>
+            <a:endParaRPr lang="pt-BR" dirty="0"/>
+          </a:p>
+          <a:p>
+            <a:pPr marL="514350" indent="-514350" algn="just">
+              <a:buAutoNum type="arabicPeriod"/>
+            </a:pPr>
+            <a:r>
+              <a:rPr lang="pt-BR" dirty="0" err="1"/>
+              <a:t>MoDisco</a:t>
+            </a:r>
+            <a:r>
+              <a:rPr lang="pt-BR" dirty="0"/>
+              <a:t> [KDM] (</a:t>
+            </a:r>
+            <a:r>
+              <a:rPr lang="pt-BR" dirty="0" err="1"/>
+              <a:t>Plugin</a:t>
+            </a:r>
+            <a:r>
+              <a:rPr lang="pt-BR" dirty="0"/>
+              <a:t> do Eclipse)</a:t>
+            </a:r>
+          </a:p>
+          <a:p>
+            <a:pPr marL="514350" indent="-514350" algn="just">
+              <a:buAutoNum type="arabicPeriod"/>
+            </a:pPr>
+            <a:r>
+              <a:rPr lang="pt-BR" dirty="0" err="1"/>
+              <a:t>CloudMig</a:t>
+            </a:r>
+            <a:r>
+              <a:rPr lang="pt-BR" dirty="0"/>
+              <a:t> </a:t>
+            </a:r>
+            <a:r>
+              <a:rPr lang="pt-BR" dirty="0" err="1"/>
+              <a:t>Xpress</a:t>
+            </a:r>
+            <a:r>
+              <a:rPr lang="pt-BR" dirty="0"/>
+              <a:t> (</a:t>
+            </a:r>
+            <a:r>
+              <a:rPr lang="pt-BR" dirty="0">
+                <a:hlinkClick r:id="rId2"/>
+              </a:rPr>
+              <a:t>sourceforge.net</a:t>
+            </a:r>
+            <a:r>
+              <a:rPr lang="pt-BR" dirty="0"/>
+              <a:t>)</a:t>
+            </a:r>
+          </a:p>
+          <a:p>
+            <a:pPr marL="514350" indent="-514350" algn="just">
+              <a:buAutoNum type="arabicPeriod"/>
+            </a:pPr>
+            <a:r>
+              <a:rPr lang="pt-BR" dirty="0" err="1"/>
+              <a:t>OpenTOSCA</a:t>
+            </a:r>
+            <a:r>
+              <a:rPr lang="pt-BR" dirty="0"/>
+              <a:t> (Padrão TOSCA, OASIS) (</a:t>
+            </a:r>
+            <a:r>
+              <a:rPr lang="pt-BR" dirty="0">
+                <a:hlinkClick r:id="rId3"/>
+              </a:rPr>
+              <a:t>opentosca.org</a:t>
+            </a:r>
+            <a:r>
+              <a:rPr lang="pt-BR" dirty="0"/>
+              <a:t>)</a:t>
+            </a:r>
+          </a:p>
+          <a:p>
+            <a:pPr marL="514350" indent="-514350" algn="just">
+              <a:buAutoNum type="arabicPeriod"/>
+            </a:pPr>
+            <a:r>
+              <a:rPr lang="pt-BR" dirty="0" err="1"/>
+              <a:t>Cloudify</a:t>
+            </a:r>
+            <a:r>
+              <a:rPr lang="pt-BR" dirty="0"/>
+              <a:t> (</a:t>
+            </a:r>
+            <a:r>
+              <a:rPr lang="pt-BR" dirty="0">
+                <a:hlinkClick r:id="rId4"/>
+              </a:rPr>
+              <a:t>https://getcloudify.org/</a:t>
+            </a:r>
+            <a:r>
+              <a:rPr lang="pt-BR" dirty="0"/>
+              <a:t>)</a:t>
+            </a:r>
+          </a:p>
+          <a:p>
+            <a:pPr marL="514350" indent="-514350" algn="just">
+              <a:buAutoNum type="arabicPeriod"/>
+            </a:pPr>
+            <a:r>
+              <a:rPr lang="pt-BR" dirty="0"/>
+              <a:t>DDD (Domain </a:t>
+            </a:r>
+            <a:r>
+              <a:rPr lang="pt-BR" dirty="0" err="1"/>
+              <a:t>Driven</a:t>
+            </a:r>
+            <a:r>
+              <a:rPr lang="pt-BR" dirty="0"/>
+              <a:t> Design), projeto orientado a domínio</a:t>
             </a:r>
           </a:p>
         </p:txBody>
@@ -5244,7 +5039,7 @@
     </p:spTree>
     <p:extLst>
       <p:ext uri="{BB962C8B-B14F-4D97-AF65-F5344CB8AC3E}">
-        <p14:creationId xmlns:p14="http://schemas.microsoft.com/office/powerpoint/2010/main" val="1176447797"/>
+        <p14:creationId xmlns:p14="http://schemas.microsoft.com/office/powerpoint/2010/main" val="3964213842"/>
       </p:ext>
     </p:extLst>
   </p:cSld>
@@ -5295,16 +5090,18 @@
           </a:xfrm>
         </p:spPr>
         <p:txBody>
-          <a:bodyPr/>
+          <a:bodyPr>
+            <a:normAutofit/>
+          </a:bodyPr>
           <a:lstStyle/>
           <a:p>
             <a:r>
-              <a:rPr lang="en-US" b="1" dirty="0" err="1">
+              <a:rPr lang="pt-BR" b="1" dirty="0">
                 <a:solidFill>
                   <a:srgbClr val="0070C0"/>
                 </a:solidFill>
               </a:rPr>
-              <a:t>Conceitos</a:t>
+              <a:t>Princípios</a:t>
             </a:r>
             <a:r>
               <a:rPr lang="en-US" b="1" dirty="0">
@@ -5312,23 +5109,7 @@
                   <a:srgbClr val="0070C0"/>
                 </a:solidFill>
               </a:rPr>
-              <a:t> </a:t>
-            </a:r>
-            <a:r>
-              <a:rPr lang="en-US" b="1" dirty="0" err="1">
-                <a:solidFill>
-                  <a:srgbClr val="0070C0"/>
-                </a:solidFill>
-              </a:rPr>
-              <a:t>em</a:t>
-            </a:r>
-            <a:r>
-              <a:rPr lang="en-US" b="1" dirty="0">
-                <a:solidFill>
-                  <a:srgbClr val="0070C0"/>
-                </a:solidFill>
-              </a:rPr>
-              <a:t> Eng. De Software</a:t>
+              <a:t> - Eng. De Software</a:t>
             </a:r>
           </a:p>
         </p:txBody>
@@ -5352,7 +5133,7 @@
         <p:spPr>
           <a:xfrm>
             <a:off x="457200" y="1600200"/>
-            <a:ext cx="8572500" cy="4525963"/>
+            <a:ext cx="8572500" cy="4983162"/>
           </a:xfrm>
         </p:spPr>
         <p:txBody>
@@ -5374,7 +5155,7 @@
             </a:r>
           </a:p>
           <a:p>
-            <a:pPr marL="0" indent="0">
+            <a:pPr marL="0" indent="0" algn="just">
               <a:buNone/>
             </a:pPr>
             <a:r>
@@ -5382,12 +5163,12 @@
               <a:t>	Os princípios da engenharia de software são sete de acordo com o cientista David </a:t>
             </a:r>
             <a:r>
-              <a:rPr lang="pt-BR" sz="1800" dirty="0" err="1"/>
+              <a:rPr lang="pt-BR" sz="1800" b="1" dirty="0" err="1"/>
               <a:t>Hooker</a:t>
             </a:r>
             <a:r>
               <a:rPr lang="pt-BR" sz="1800" dirty="0"/>
-              <a:t>. Eles são chamados gerais porque podem ser aplicados a uma única camada da engenharia de software, sua qualidade, processos, métodos ou ferramentas, bem como a ela como um todo.</a:t>
+              <a:t>. Aplicados a sua qualidade, processos, métodos ou ferramentas, bem como a ela como um todo.</a:t>
             </a:r>
           </a:p>
           <a:p>
@@ -5404,7 +5185,7 @@
               <a:t> - (A </a:t>
             </a:r>
             <a:r>
-              <a:rPr lang="en-US" sz="1800" dirty="0" err="1"/>
+              <a:rPr lang="pt-BR" sz="1800" dirty="0"/>
               <a:t>razão</a:t>
             </a:r>
             <a:r>
@@ -5412,13 +5193,28 @@
               <a:t> de </a:t>
             </a:r>
             <a:r>
-              <a:rPr lang="en-US" sz="1800" dirty="0" err="1"/>
+              <a:rPr lang="pt-BR" sz="1800" dirty="0"/>
               <a:t>existir</a:t>
             </a:r>
             <a:r>
               <a:rPr lang="en-US" sz="1800" dirty="0"/>
               <a:t>)</a:t>
             </a:r>
+          </a:p>
+          <a:p>
+            <a:pPr algn="just">
+              <a:buFont typeface="Wingdings" pitchFamily="2" charset="2"/>
+              <a:buChar char="ü"/>
+            </a:pPr>
+            <a:r>
+              <a:rPr lang="en-US" sz="1800" b="1" dirty="0"/>
+              <a:t>KISS (Keep It Simple, Stupid!)</a:t>
+            </a:r>
+            <a:r>
+              <a:rPr lang="pt-BR" sz="1800" dirty="0"/>
+              <a:t> – (Não complique)</a:t>
+            </a:r>
+            <a:endParaRPr lang="en-US" sz="1800" dirty="0"/>
           </a:p>
           <a:p>
             <a:pPr>
@@ -5426,14 +5222,25 @@
               <a:buChar char="ü"/>
             </a:pPr>
             <a:r>
-              <a:rPr lang="en-US" sz="1800" b="1" dirty="0"/>
-              <a:t>KISS (Keep It Simple, Stupid!)</a:t>
+              <a:rPr lang="pt-BR" sz="1800" b="1" dirty="0" err="1"/>
+              <a:t>Maintain</a:t>
+            </a:r>
+            <a:r>
+              <a:rPr lang="pt-BR" sz="1800" b="1" dirty="0"/>
+              <a:t> </a:t>
+            </a:r>
+            <a:r>
+              <a:rPr lang="pt-BR" sz="1800" b="1" dirty="0" err="1"/>
+              <a:t>the</a:t>
+            </a:r>
+            <a:r>
+              <a:rPr lang="pt-BR" sz="1800" b="1" dirty="0"/>
+              <a:t> </a:t>
             </a:r>
             <a:r>
               <a:rPr lang="pt-BR" sz="1800" dirty="0"/>
-              <a:t> – (Não complique)</a:t>
-            </a:r>
-            <a:endParaRPr lang="en-US" sz="1800" dirty="0"/>
+              <a:t>Vision – (Mantenha a visão)</a:t>
+            </a:r>
           </a:p>
           <a:p>
             <a:pPr>
@@ -5441,46 +5248,20 @@
               <a:buChar char="ü"/>
             </a:pPr>
             <a:r>
+              <a:rPr lang="en-US" sz="1800" b="1" dirty="0"/>
+              <a:t>What You Produce, </a:t>
+            </a:r>
+            <a:r>
               <a:rPr lang="pt-BR" sz="1800" b="1" dirty="0" err="1"/>
-              <a:t>Maintain</a:t>
-            </a:r>
-            <a:r>
-              <a:rPr lang="pt-BR" sz="1800" b="1" dirty="0"/>
-              <a:t> </a:t>
-            </a:r>
-            <a:r>
-              <a:rPr lang="pt-BR" sz="1800" b="1" dirty="0" err="1"/>
-              <a:t>the</a:t>
-            </a:r>
-            <a:r>
-              <a:rPr lang="pt-BR" sz="1800" b="1" dirty="0"/>
-              <a:t> </a:t>
-            </a:r>
-            <a:r>
-              <a:rPr lang="pt-BR" sz="1800" dirty="0"/>
-              <a:t>Vision – (Mantenha a visão)</a:t>
-            </a:r>
-          </a:p>
-          <a:p>
-            <a:pPr>
-              <a:buFont typeface="Wingdings" pitchFamily="2" charset="2"/>
-              <a:buChar char="ü"/>
-            </a:pPr>
+              <a:t>Others</a:t>
+            </a:r>
             <a:r>
               <a:rPr lang="en-US" sz="1800" b="1" dirty="0"/>
-              <a:t>What You Produce, Others Will Consume</a:t>
+              <a:t> Will Consume</a:t>
             </a:r>
             <a:r>
               <a:rPr lang="en-US" sz="1800" dirty="0"/>
-              <a:t> – ( O </a:t>
-            </a:r>
-            <a:r>
-              <a:rPr lang="en-US" sz="1800" dirty="0" err="1"/>
-              <a:t>que</a:t>
-            </a:r>
-            <a:r>
-              <a:rPr lang="en-US" sz="1800" dirty="0"/>
-              <a:t> um </a:t>
+              <a:t> – ( O que um </a:t>
             </a:r>
             <a:r>
               <a:rPr lang="en-US" sz="1800" dirty="0" err="1"/>
@@ -5488,15 +5269,7 @@
             </a:r>
             <a:r>
               <a:rPr lang="en-US" sz="1800" dirty="0"/>
-              <a:t> outros </a:t>
-            </a:r>
-            <a:r>
-              <a:rPr lang="en-US" sz="1800" dirty="0" err="1"/>
-              <a:t>consomem</a:t>
-            </a:r>
-            <a:r>
-              <a:rPr lang="en-US" sz="1800" dirty="0"/>
-              <a:t>)</a:t>
+              <a:t>, outros consomem)</a:t>
             </a:r>
           </a:p>
           <a:p>
@@ -5622,7 +5395,7 @@
                   <a:srgbClr val="0070C0"/>
                 </a:solidFill>
               </a:rPr>
-              <a:t>Conceitos</a:t>
+              <a:t>Etapas</a:t>
             </a:r>
             <a:r>
               <a:rPr lang="en-US" b="1" dirty="0">
@@ -5669,8 +5442,8 @@
         </p:nvSpPr>
         <p:spPr>
           <a:xfrm>
-            <a:off x="457200" y="1600200"/>
-            <a:ext cx="8572500" cy="4924586"/>
+            <a:off x="457200" y="1600199"/>
+            <a:ext cx="8572500" cy="5122333"/>
           </a:xfrm>
         </p:spPr>
         <p:txBody>
@@ -5679,31 +5452,12 @@
           </a:bodyPr>
           <a:lstStyle/>
           <a:p>
-            <a:pPr marL="0" indent="0" algn="just">
-              <a:buNone/>
-            </a:pPr>
-            <a:r>
-              <a:rPr lang="pt-BR" b="1" dirty="0"/>
-              <a:t>	</a:t>
-            </a:r>
-            <a:r>
-              <a:rPr lang="pt-BR" b="1" u="sng" dirty="0"/>
-              <a:t>Fases da Engenharia de Software</a:t>
-            </a:r>
-          </a:p>
-          <a:p>
-            <a:pPr marL="0" indent="0" algn="just">
-              <a:buNone/>
-            </a:pPr>
-            <a:endParaRPr lang="pt-BR" sz="2400" dirty="0"/>
-          </a:p>
-          <a:p>
             <a:pPr algn="just">
               <a:buAutoNum type="arabicPeriod"/>
             </a:pPr>
             <a:r>
               <a:rPr lang="pt-BR" sz="2400" dirty="0"/>
-              <a:t>Elaboração do Projeto Técnico / Consultor</a:t>
+              <a:t>Elaboração do Projeto Técnico / Consultor do Negócio</a:t>
             </a:r>
           </a:p>
           <a:p>
@@ -5739,7 +5493,15 @@
             </a:pPr>
             <a:r>
               <a:rPr lang="pt-BR" sz="2400" dirty="0"/>
-              <a:t>Equipe de Testes (Qualidade do Produto) – Testes Internos</a:t>
+              <a:t>Equipe de Testes (</a:t>
+            </a:r>
+            <a:r>
+              <a:rPr lang="pt-BR" sz="2400" b="1" dirty="0"/>
+              <a:t>Qualidade do Produto</a:t>
+            </a:r>
+            <a:r>
+              <a:rPr lang="pt-BR" sz="2400" dirty="0"/>
+              <a:t>) – Testes Internos</a:t>
             </a:r>
           </a:p>
           <a:p>
@@ -5856,7 +5618,7 @@
                   <a:srgbClr val="0070C0"/>
                 </a:solidFill>
               </a:rPr>
-              <a:t>Conceitos</a:t>
+              <a:t>Fases</a:t>
             </a:r>
             <a:r>
               <a:rPr lang="en-US" b="1" dirty="0">
@@ -5864,23 +5626,7 @@
                   <a:srgbClr val="0070C0"/>
                 </a:solidFill>
               </a:rPr>
-              <a:t> </a:t>
-            </a:r>
-            <a:r>
-              <a:rPr lang="en-US" b="1" dirty="0" err="1">
-                <a:solidFill>
-                  <a:srgbClr val="0070C0"/>
-                </a:solidFill>
-              </a:rPr>
-              <a:t>em</a:t>
-            </a:r>
-            <a:r>
-              <a:rPr lang="en-US" b="1" dirty="0">
-                <a:solidFill>
-                  <a:srgbClr val="0070C0"/>
-                </a:solidFill>
-              </a:rPr>
-              <a:t> Eng. De Software</a:t>
+              <a:t> da Eng. De Software</a:t>
             </a:r>
           </a:p>
         </p:txBody>
@@ -5904,7 +5650,7 @@
         <p:spPr>
           <a:xfrm>
             <a:off x="457200" y="1600200"/>
-            <a:ext cx="8572500" cy="4525963"/>
+            <a:ext cx="8572500" cy="5105400"/>
           </a:xfrm>
         </p:spPr>
         <p:txBody>
@@ -5917,26 +5663,7 @@
               <a:buNone/>
             </a:pPr>
             <a:r>
-              <a:rPr lang="pt-BR" b="1" dirty="0"/>
-              <a:t>	</a:t>
-            </a:r>
-            <a:r>
-              <a:rPr lang="pt-BR" b="1" u="sng" dirty="0"/>
-              <a:t>Fases da Engenharia de Software</a:t>
-            </a:r>
-          </a:p>
-          <a:p>
-            <a:pPr marL="0" indent="0" algn="just">
-              <a:buNone/>
-            </a:pPr>
-            <a:endParaRPr lang="pt-BR" dirty="0"/>
-          </a:p>
-          <a:p>
-            <a:pPr marL="0" indent="0" algn="just">
-              <a:buNone/>
-            </a:pPr>
-            <a:r>
-              <a:rPr lang="pt-BR" b="1" dirty="0">
+              <a:rPr lang="pt-BR" sz="2400" b="1" dirty="0">
                 <a:solidFill>
                   <a:srgbClr val="0070C0"/>
                 </a:solidFill>
@@ -5949,7 +5676,16 @@
               <a:buAutoNum type="arabicPeriod"/>
             </a:pPr>
             <a:r>
-              <a:rPr lang="pt-BR" dirty="0"/>
+              <a:rPr lang="pt-BR" sz="2400" dirty="0"/>
+              <a:t>Elicitação de Requisitos</a:t>
+            </a:r>
+          </a:p>
+          <a:p>
+            <a:pPr lvl="1" algn="just">
+              <a:buAutoNum type="arabicPeriod"/>
+            </a:pPr>
+            <a:r>
+              <a:rPr lang="pt-BR" sz="2400" dirty="0"/>
               <a:t>Levantamento de Requisitos</a:t>
             </a:r>
           </a:p>
@@ -5958,7 +5694,7 @@
               <a:buAutoNum type="arabicPeriod"/>
             </a:pPr>
             <a:r>
-              <a:rPr lang="pt-BR" dirty="0"/>
+              <a:rPr lang="pt-BR" sz="2400" dirty="0"/>
               <a:t>Entrevistas / Questionários / Prototipação</a:t>
             </a:r>
           </a:p>
@@ -5967,7 +5703,7 @@
               <a:buAutoNum type="arabicPeriod"/>
             </a:pPr>
             <a:r>
-              <a:rPr lang="pt-BR" dirty="0"/>
+              <a:rPr lang="pt-BR" sz="2400" dirty="0"/>
               <a:t>Introdução</a:t>
             </a:r>
           </a:p>
@@ -5976,7 +5712,7 @@
               <a:buAutoNum type="arabicPeriod"/>
             </a:pPr>
             <a:r>
-              <a:rPr lang="pt-BR" dirty="0"/>
+              <a:rPr lang="pt-BR" sz="2400" dirty="0"/>
               <a:t>Objetivo(s) do Sistema</a:t>
             </a:r>
           </a:p>
@@ -5985,7 +5721,7 @@
               <a:buAutoNum type="arabicPeriod"/>
             </a:pPr>
             <a:r>
-              <a:rPr lang="pt-BR" dirty="0"/>
+              <a:rPr lang="pt-BR" sz="2400" dirty="0"/>
               <a:t>Funções do Sistema (Lista de Eventos)</a:t>
             </a:r>
           </a:p>
@@ -5995,7 +5731,7 @@
               <a:buAutoNum type="arabicPeriod"/>
             </a:pPr>
             <a:r>
-              <a:rPr lang="pt-BR" dirty="0"/>
+              <a:rPr lang="pt-BR" sz="2400" dirty="0"/>
               <a:t>Especificação de Programas</a:t>
             </a:r>
           </a:p>
@@ -6004,7 +5740,7 @@
               <a:buAutoNum type="arabicPeriod"/>
             </a:pPr>
             <a:r>
-              <a:rPr lang="pt-BR" dirty="0"/>
+              <a:rPr lang="pt-BR" sz="2400" dirty="0"/>
               <a:t>Modelo Físico de Dados (DER)</a:t>
             </a:r>
           </a:p>
@@ -6073,7 +5809,7 @@
                   <a:srgbClr val="0070C0"/>
                 </a:solidFill>
               </a:rPr>
-              <a:t>Conceitos</a:t>
+              <a:t>Fases</a:t>
             </a:r>
             <a:r>
               <a:rPr lang="en-US" b="1" dirty="0">
@@ -6081,23 +5817,7 @@
                   <a:srgbClr val="0070C0"/>
                 </a:solidFill>
               </a:rPr>
-              <a:t> </a:t>
-            </a:r>
-            <a:r>
-              <a:rPr lang="en-US" b="1" dirty="0" err="1">
-                <a:solidFill>
-                  <a:srgbClr val="0070C0"/>
-                </a:solidFill>
-              </a:rPr>
-              <a:t>em</a:t>
-            </a:r>
-            <a:r>
-              <a:rPr lang="en-US" b="1" dirty="0">
-                <a:solidFill>
-                  <a:srgbClr val="0070C0"/>
-                </a:solidFill>
-              </a:rPr>
-              <a:t> Eng. De Software</a:t>
+              <a:t> da Eng. De Software</a:t>
             </a:r>
           </a:p>
         </p:txBody>
@@ -6121,7 +5841,7 @@
         <p:spPr>
           <a:xfrm>
             <a:off x="457200" y="1600200"/>
-            <a:ext cx="8572500" cy="4525963"/>
+            <a:ext cx="8572500" cy="4817533"/>
           </a:xfrm>
         </p:spPr>
         <p:txBody>
@@ -6134,11 +5854,11 @@
               <a:buNone/>
             </a:pPr>
             <a:r>
-              <a:rPr lang="pt-BR" b="1" dirty="0"/>
+              <a:rPr lang="pt-BR" sz="2400" b="1" dirty="0"/>
               <a:t>	</a:t>
             </a:r>
             <a:r>
-              <a:rPr lang="pt-BR" b="1" u="sng" dirty="0"/>
+              <a:rPr lang="pt-BR" sz="2400" b="1" u="sng" dirty="0"/>
               <a:t>Fases da Engenharia de Software</a:t>
             </a:r>
           </a:p>
@@ -6146,7 +5866,7 @@
             <a:pPr marL="0" indent="0" algn="just">
               <a:buNone/>
             </a:pPr>
-            <a:endParaRPr lang="pt-BR" dirty="0"/>
+            <a:endParaRPr lang="pt-BR" sz="2400" dirty="0"/>
           </a:p>
           <a:p>
             <a:pPr marL="971550" lvl="1" indent="-514350" algn="just">
@@ -6154,7 +5874,7 @@
               <a:buAutoNum type="arabicPeriod" startAt="6"/>
             </a:pPr>
             <a:r>
-              <a:rPr lang="pt-BR" dirty="0"/>
+              <a:rPr lang="pt-BR" sz="2400" dirty="0"/>
               <a:t>Dicionário de Dados</a:t>
             </a:r>
           </a:p>
@@ -6163,7 +5883,7 @@
               <a:buAutoNum type="arabicPeriod" startAt="6"/>
             </a:pPr>
             <a:r>
-              <a:rPr lang="pt-BR" dirty="0"/>
+              <a:rPr lang="pt-BR" sz="2400" dirty="0"/>
               <a:t>Modelo Comportamental</a:t>
             </a:r>
           </a:p>
@@ -6172,23 +5892,23 @@
               <a:buAutoNum type="arabicPeriod"/>
             </a:pPr>
             <a:r>
-              <a:rPr lang="pt-BR" dirty="0"/>
+              <a:rPr lang="pt-BR" sz="2400" dirty="0"/>
               <a:t> Tabela Pai/Filha; Relacionamento; I/E/U (</a:t>
             </a:r>
             <a:r>
-              <a:rPr lang="pt-BR" dirty="0" err="1"/>
+              <a:rPr lang="pt-BR" sz="2400" dirty="0" err="1"/>
               <a:t>Restrict</a:t>
             </a:r>
             <a:r>
-              <a:rPr lang="pt-BR" dirty="0"/>
+              <a:rPr lang="pt-BR" sz="2400" dirty="0"/>
               <a:t>/</a:t>
             </a:r>
             <a:r>
-              <a:rPr lang="pt-BR" dirty="0" err="1"/>
+              <a:rPr lang="pt-BR" sz="2400" dirty="0" err="1"/>
               <a:t>Cascade</a:t>
             </a:r>
             <a:r>
-              <a:rPr lang="pt-BR" dirty="0"/>
+              <a:rPr lang="pt-BR" sz="2400" dirty="0"/>
               <a:t>) -&gt; Modelo Comportamental</a:t>
             </a:r>
           </a:p>
@@ -6197,7 +5917,7 @@
               <a:buAutoNum type="arabicPeriod"/>
             </a:pPr>
             <a:r>
-              <a:rPr lang="pt-BR" dirty="0"/>
+              <a:rPr lang="pt-BR" sz="2400" dirty="0"/>
               <a:t>Lista de Eventos</a:t>
             </a:r>
           </a:p>
@@ -6206,7 +5926,7 @@
               <a:buAutoNum type="arabicPeriod"/>
             </a:pPr>
             <a:r>
-              <a:rPr lang="pt-BR" dirty="0"/>
+              <a:rPr lang="pt-BR" sz="2400" dirty="0"/>
               <a:t>Diagrama de Contexto</a:t>
             </a:r>
           </a:p>
@@ -6215,7 +5935,7 @@
               <a:buAutoNum type="arabicPeriod"/>
             </a:pPr>
             <a:r>
-              <a:rPr lang="pt-BR" dirty="0"/>
+              <a:rPr lang="pt-BR" sz="2400" dirty="0"/>
               <a:t>DFD Nível Zero</a:t>
             </a:r>
           </a:p>
@@ -6224,7 +5944,7 @@
               <a:buAutoNum type="arabicPeriod"/>
             </a:pPr>
             <a:r>
-              <a:rPr lang="pt-BR" dirty="0"/>
+              <a:rPr lang="pt-BR" sz="2400" dirty="0"/>
               <a:t>DFD por Evento</a:t>
             </a:r>
           </a:p>
@@ -6293,7 +6013,7 @@
                   <a:srgbClr val="0070C0"/>
                 </a:solidFill>
               </a:rPr>
-              <a:t>Conceitos</a:t>
+              <a:t>Fases</a:t>
             </a:r>
             <a:r>
               <a:rPr lang="en-US" b="1" dirty="0">
@@ -6301,23 +6021,7 @@
                   <a:srgbClr val="0070C0"/>
                 </a:solidFill>
               </a:rPr>
-              <a:t> </a:t>
-            </a:r>
-            <a:r>
-              <a:rPr lang="en-US" b="1" dirty="0" err="1">
-                <a:solidFill>
-                  <a:srgbClr val="0070C0"/>
-                </a:solidFill>
-              </a:rPr>
-              <a:t>em</a:t>
-            </a:r>
-            <a:r>
-              <a:rPr lang="en-US" b="1" dirty="0">
-                <a:solidFill>
-                  <a:srgbClr val="0070C0"/>
-                </a:solidFill>
-              </a:rPr>
-              <a:t> Eng. De Software</a:t>
+              <a:t> da Eng. De Software</a:t>
             </a:r>
           </a:p>
         </p:txBody>
@@ -6354,19 +6058,10 @@
               <a:buNone/>
             </a:pPr>
             <a:r>
-              <a:rPr lang="pt-BR" b="1" dirty="0"/>
+              <a:rPr lang="pt-BR" sz="2400" b="1" dirty="0"/>
               <a:t>	</a:t>
             </a:r>
-            <a:r>
-              <a:rPr lang="pt-BR" b="1" u="sng" dirty="0"/>
-              <a:t>Fases da Engenharia de Software</a:t>
-            </a:r>
-          </a:p>
-          <a:p>
-            <a:pPr marL="0" indent="0" algn="just">
-              <a:buNone/>
-            </a:pPr>
-            <a:endParaRPr lang="pt-BR" dirty="0"/>
+            <a:endParaRPr lang="pt-BR" sz="2400" dirty="0"/>
           </a:p>
           <a:p>
             <a:pPr marL="971550" lvl="1" indent="-514350" algn="just">
@@ -6374,7 +6069,7 @@
               <a:buAutoNum type="arabicPeriod" startAt="8"/>
             </a:pPr>
             <a:r>
-              <a:rPr lang="pt-BR" dirty="0"/>
+              <a:rPr lang="pt-BR" sz="2400" dirty="0"/>
               <a:t>Telas da Aplicação (Interface)</a:t>
             </a:r>
           </a:p>
@@ -6383,7 +6078,7 @@
               <a:buAutoNum type="arabicPeriod"/>
             </a:pPr>
             <a:r>
-              <a:rPr lang="pt-BR" dirty="0"/>
+              <a:rPr lang="pt-BR" sz="2400" dirty="0"/>
               <a:t>Estrutura do Menu da Aplicação</a:t>
             </a:r>
           </a:p>
@@ -6392,7 +6087,7 @@
               <a:buAutoNum type="arabicPeriod" startAt="8"/>
             </a:pPr>
             <a:r>
-              <a:rPr lang="pt-BR" dirty="0"/>
+              <a:rPr lang="pt-BR" sz="2400" dirty="0"/>
               <a:t>Anexos (Layouts de Relatórios)</a:t>
             </a:r>
           </a:p>
@@ -6532,7 +6227,7 @@
             </a:r>
             <a:r>
               <a:rPr lang="pt-BR" dirty="0"/>
-              <a:t> vem ajudando muitas equipes a encarar a imprevisibilidades dentro de um projeto através de entregas incrementais e ciclos iterativos.</a:t>
+              <a:t> entregas incrementais e ciclos iterativos.</a:t>
             </a:r>
           </a:p>
           <a:p>
@@ -6650,6 +6345,22 @@
               </a:rPr>
               <a:t>Ágeis</a:t>
             </a:r>
+            <a:r>
+              <a:rPr lang="en-US" b="1" dirty="0">
+                <a:solidFill>
+                  <a:srgbClr val="0070C0"/>
+                </a:solidFill>
+              </a:rPr>
+              <a:t> - </a:t>
+            </a:r>
+            <a:r>
+              <a:rPr lang="en-US" b="1" dirty="0" err="1">
+                <a:solidFill>
+                  <a:srgbClr val="0070C0"/>
+                </a:solidFill>
+              </a:rPr>
+              <a:t>Características</a:t>
+            </a:r>
             <a:endParaRPr lang="en-US" b="1" dirty="0">
               <a:solidFill>
                 <a:srgbClr val="0070C0"/>
@@ -6691,51 +6402,57 @@
             </a:pPr>
             <a:r>
               <a:rPr lang="pt-BR" dirty="0"/>
-              <a:t>	Partindo do princípio de que os projetos têm início e fim definidos, e que eles são planejados e desenvolvidos em etapas, algumas das principais características — além de agilidade — dos métodos ágeis são:</a:t>
-            </a:r>
+              <a:t>	Além de agilidade, os métodos ágeis são:</a:t>
+            </a:r>
+          </a:p>
+          <a:p>
+            <a:pPr marL="0" indent="0" algn="just">
+              <a:buNone/>
+            </a:pPr>
+            <a:endParaRPr lang="pt-BR" sz="2400" dirty="0"/>
           </a:p>
           <a:p>
             <a:pPr algn="just"/>
             <a:r>
-              <a:rPr lang="pt-BR" sz="2100" dirty="0"/>
+              <a:rPr lang="pt-BR" sz="2400" dirty="0"/>
               <a:t>processo incremental (quase uma antítese do tradicional modelo de cascata);</a:t>
             </a:r>
           </a:p>
           <a:p>
             <a:pPr algn="just"/>
             <a:r>
-              <a:rPr lang="pt-BR" sz="2100" dirty="0"/>
+              <a:rPr lang="pt-BR" sz="2400" dirty="0"/>
               <a:t>colaboração do cliente;</a:t>
             </a:r>
           </a:p>
           <a:p>
             <a:pPr algn="just"/>
             <a:r>
-              <a:rPr lang="pt-BR" sz="2100" dirty="0"/>
+              <a:rPr lang="pt-BR" sz="2400" dirty="0"/>
               <a:t>adaptabilidade (cada projeto está sujeito a passar por várias modificações);</a:t>
             </a:r>
           </a:p>
           <a:p>
             <a:pPr algn="just"/>
             <a:r>
-              <a:rPr lang="pt-BR" sz="2100" dirty="0"/>
+              <a:rPr lang="pt-BR" sz="2400" dirty="0"/>
               <a:t>simplicidade;</a:t>
             </a:r>
           </a:p>
           <a:p>
             <a:pPr algn="just"/>
             <a:r>
-              <a:rPr lang="pt-BR" sz="2100" dirty="0"/>
+              <a:rPr lang="pt-BR" sz="2400" dirty="0"/>
               <a:t>feedback constante;</a:t>
             </a:r>
           </a:p>
           <a:p>
             <a:pPr algn="just"/>
             <a:r>
-              <a:rPr lang="pt-BR" sz="2100" dirty="0"/>
+              <a:rPr lang="pt-BR" sz="2400" dirty="0"/>
               <a:t>equipes pequenas (mas com alto nível técnico) etc.</a:t>
             </a:r>
-            <a:endParaRPr lang="pt-BR" sz="2100" b="1" dirty="0"/>
+            <a:endParaRPr lang="pt-BR" sz="2400" b="1" dirty="0"/>
           </a:p>
         </p:txBody>
       </p:sp>
@@ -6901,23 +6618,7 @@
                   <a:schemeClr val="bg1"/>
                 </a:solidFill>
               </a:rPr>
-              <a:t>Conceitos Eng. </a:t>
-            </a:r>
-            <a:r>
-              <a:rPr lang="pt-BR" b="1">
-                <a:solidFill>
-                  <a:schemeClr val="bg1"/>
-                </a:solidFill>
-              </a:rPr>
-              <a:t>Soft. </a:t>
-            </a:r>
-            <a:r>
-              <a:rPr lang="pt-BR" b="1" dirty="0">
-                <a:solidFill>
-                  <a:schemeClr val="bg1"/>
-                </a:solidFill>
-              </a:rPr>
-              <a:t>e Métodos Ágeis</a:t>
+              <a:t>Eng. Soft. e Métodos Ágeis</a:t>
             </a:r>
             <a:endParaRPr lang="pt-BR" sz="4800" b="1" dirty="0">
               <a:solidFill>
@@ -6954,7 +6655,7 @@
           </a:ln>
           <a:extLst>
             <a:ext uri="{C572A759-6A51-4108-AA02-DFA0A04FC94B}">
-              <ma14:wrappingTextBoxFlag xmlns:ma14="http://schemas.microsoft.com/office/mac/drawingml/2011/main" xmlns="" val="1"/>
+              <ma14:wrappingTextBoxFlag xmlns="" xmlns:ma14="http://schemas.microsoft.com/office/mac/drawingml/2011/main" val="1"/>
             </a:ext>
           </a:extLst>
         </p:spPr>
@@ -7335,6 +7036,22 @@
               </a:rPr>
               <a:t>Ágeis</a:t>
             </a:r>
+            <a:r>
+              <a:rPr lang="en-US" b="1" dirty="0">
+                <a:solidFill>
+                  <a:srgbClr val="0070C0"/>
+                </a:solidFill>
+              </a:rPr>
+              <a:t> - </a:t>
+            </a:r>
+            <a:r>
+              <a:rPr lang="en-US" b="1" dirty="0" err="1">
+                <a:solidFill>
+                  <a:srgbClr val="0070C0"/>
+                </a:solidFill>
+              </a:rPr>
+              <a:t>Vantagens</a:t>
+            </a:r>
             <a:endParaRPr lang="en-US" b="1" dirty="0">
               <a:solidFill>
                 <a:srgbClr val="0070C0"/>
@@ -7371,40 +7088,40 @@
           </a:bodyPr>
           <a:lstStyle/>
           <a:p>
-            <a:pPr marL="0" indent="0">
-              <a:buNone/>
+            <a:pPr>
+              <a:buFont typeface="Wingdings" panose="05000000000000000000" pitchFamily="2" charset="2"/>
+              <a:buChar char="§"/>
             </a:pPr>
-            <a:r>
-              <a:rPr lang="pt-BR" b="1" dirty="0"/>
-              <a:t>Vantagens dos métodos ágeis para a equipe</a:t>
-            </a:r>
-            <a:endParaRPr lang="pt-BR" b="1" u="sng" dirty="0"/>
-          </a:p>
-          <a:p>
-            <a:pPr marL="0" indent="0" algn="just">
-              <a:buNone/>
-            </a:pPr>
-            <a:endParaRPr lang="pt-BR" b="1" u="sng" dirty="0"/>
-          </a:p>
-          <a:p>
             <a:r>
               <a:rPr lang="pt-BR" dirty="0"/>
               <a:t>Entregas rápidas e frequentes</a:t>
             </a:r>
           </a:p>
           <a:p>
+            <a:pPr>
+              <a:buFont typeface="Wingdings" panose="05000000000000000000" pitchFamily="2" charset="2"/>
+              <a:buChar char="§"/>
+            </a:pPr>
             <a:r>
               <a:rPr lang="pt-BR" dirty="0"/>
               <a:t>Qualidade do produto</a:t>
             </a:r>
           </a:p>
           <a:p>
+            <a:pPr>
+              <a:buFont typeface="Wingdings" panose="05000000000000000000" pitchFamily="2" charset="2"/>
+              <a:buChar char="§"/>
+            </a:pPr>
             <a:r>
               <a:rPr lang="pt-BR" dirty="0"/>
               <a:t>Previsão de cronograma e custos</a:t>
             </a:r>
           </a:p>
           <a:p>
+            <a:pPr>
+              <a:buFont typeface="Wingdings" panose="05000000000000000000" pitchFamily="2" charset="2"/>
+              <a:buChar char="§"/>
+            </a:pPr>
             <a:r>
               <a:rPr lang="pt-BR" dirty="0"/>
               <a:t>Mitigação de riscos</a:t>
@@ -9122,23 +8839,7 @@
                   <a:srgbClr val="0070C0"/>
                 </a:solidFill>
               </a:rPr>
-              <a:t>Conceitos</a:t>
-            </a:r>
-            <a:r>
-              <a:rPr lang="en-US" b="1" dirty="0">
-                <a:solidFill>
-                  <a:srgbClr val="0070C0"/>
-                </a:solidFill>
-              </a:rPr>
-              <a:t> </a:t>
-            </a:r>
-            <a:r>
-              <a:rPr lang="en-US" b="1" dirty="0" err="1">
-                <a:solidFill>
-                  <a:srgbClr val="0070C0"/>
-                </a:solidFill>
-              </a:rPr>
-              <a:t>em</a:t>
+              <a:t>Introdução</a:t>
             </a:r>
             <a:r>
               <a:rPr lang="en-US" b="1" dirty="0">
@@ -9219,7 +8920,15 @@
             </a:r>
             <a:r>
               <a:rPr lang="pt-BR" dirty="0"/>
-              <a:t> é o conjunto de vários artefatos e não apenas o código fonte (SOMMERVILLE, 2003).</a:t>
+              <a:t> é o conjunto de vários artefatos e não apenas o código fonte (</a:t>
+            </a:r>
+            <a:r>
+              <a:rPr lang="pt-BR" b="1" dirty="0"/>
+              <a:t>SOMMERVILLE</a:t>
+            </a:r>
+            <a:r>
+              <a:rPr lang="pt-BR" dirty="0"/>
+              <a:t>, 2003).</a:t>
             </a:r>
             <a:endParaRPr lang="en-US" dirty="0"/>
           </a:p>
@@ -9336,7 +9045,7 @@
         <p:spPr>
           <a:xfrm>
             <a:off x="457200" y="1600200"/>
-            <a:ext cx="8572500" cy="4525963"/>
+            <a:ext cx="8572500" cy="4983162"/>
           </a:xfrm>
         </p:spPr>
         <p:txBody>
@@ -9353,7 +9062,7 @@
               <a:t>	Com foco na gestão do projeto, o </a:t>
             </a:r>
             <a:r>
-              <a:rPr lang="pt-BR" sz="2400" dirty="0" err="1"/>
+              <a:rPr lang="pt-BR" sz="2400" b="1" dirty="0" err="1"/>
               <a:t>Scrum</a:t>
             </a:r>
             <a:r>
@@ -9361,7 +9070,7 @@
               <a:t> tem como base o planejamento iterativo e incremental, que se dá, conforme já explicado, pelas reuniões conhecidas como </a:t>
             </a:r>
             <a:r>
-              <a:rPr lang="pt-BR" sz="2400" dirty="0" err="1"/>
+              <a:rPr lang="pt-BR" sz="2400" b="1" dirty="0" err="1"/>
               <a:t>Sprints</a:t>
             </a:r>
             <a:r>
@@ -9376,7 +9085,7 @@
             <a:endParaRPr lang="pt-BR" sz="2400" dirty="0"/>
           </a:p>
           <a:p>
-            <a:pPr marL="0" indent="0">
+            <a:pPr marL="0" indent="0" algn="just">
               <a:buNone/>
             </a:pPr>
             <a:r>
@@ -9384,15 +9093,15 @@
               <a:t>	Ele reitera, desde o início do projeto, a lista de funcionalidades a serem desenvolvidas — prática também chamada, no caso, de </a:t>
             </a:r>
             <a:r>
-              <a:rPr lang="pt-BR" sz="2400" dirty="0" err="1"/>
+              <a:rPr lang="pt-BR" sz="2400" b="1" dirty="0" err="1"/>
               <a:t>product</a:t>
             </a:r>
             <a:r>
-              <a:rPr lang="pt-BR" sz="2400" dirty="0"/>
+              <a:rPr lang="pt-BR" sz="2400" b="1" dirty="0"/>
               <a:t> </a:t>
             </a:r>
             <a:r>
-              <a:rPr lang="pt-BR" sz="2400" dirty="0" err="1"/>
+              <a:rPr lang="pt-BR" sz="2400" b="1" dirty="0" err="1"/>
               <a:t>backlog</a:t>
             </a:r>
             <a:r>
@@ -9407,7 +9116,7 @@
             <a:endParaRPr lang="pt-BR" sz="2400" dirty="0"/>
           </a:p>
           <a:p>
-            <a:pPr marL="0" indent="0">
+            <a:pPr marL="0" indent="0" algn="just">
               <a:buNone/>
             </a:pPr>
             <a:r>
@@ -9415,35 +9124,39 @@
               <a:t>	No andamento do processo, cada funcionalidade se torna um Sprint, cujos detalhes a serem criados e desenvolvidos passam do </a:t>
             </a:r>
             <a:r>
-              <a:rPr lang="pt-BR" sz="2400" dirty="0" err="1"/>
+              <a:rPr lang="pt-BR" sz="2400" b="1" dirty="0" err="1"/>
               <a:t>product</a:t>
             </a:r>
             <a:r>
+              <a:rPr lang="pt-BR" sz="2400" b="1" dirty="0"/>
+              <a:t> </a:t>
+            </a:r>
+            <a:r>
+              <a:rPr lang="pt-BR" sz="2400" b="1" dirty="0" err="1"/>
+              <a:t>backlog</a:t>
+            </a:r>
+            <a:r>
+              <a:rPr lang="pt-BR" sz="2400" b="1" dirty="0"/>
+              <a:t> </a:t>
+            </a:r>
+            <a:r>
               <a:rPr lang="pt-BR" sz="2400" dirty="0"/>
+              <a:t>para o </a:t>
+            </a:r>
+            <a:r>
+              <a:rPr lang="pt-BR" sz="2400" b="1" dirty="0" err="1"/>
+              <a:t>sprint</a:t>
+            </a:r>
+            <a:r>
+              <a:rPr lang="pt-BR" sz="2400" b="1" dirty="0"/>
               <a:t> </a:t>
             </a:r>
             <a:r>
-              <a:rPr lang="pt-BR" sz="2400" dirty="0" err="1"/>
+              <a:rPr lang="pt-BR" sz="2400" b="1" dirty="0" err="1"/>
               <a:t>backlog</a:t>
             </a:r>
             <a:r>
-              <a:rPr lang="pt-BR" sz="2400" dirty="0"/>
-              <a:t> para o </a:t>
-            </a:r>
-            <a:r>
-              <a:rPr lang="pt-BR" sz="2400" dirty="0" err="1"/>
-              <a:t>sprint</a:t>
-            </a:r>
-            <a:r>
-              <a:rPr lang="pt-BR" sz="2400" dirty="0"/>
-              <a:t> </a:t>
-            </a:r>
-            <a:r>
-              <a:rPr lang="pt-BR" sz="2400" dirty="0" err="1"/>
-              <a:t>backlog</a:t>
-            </a:r>
-            <a:r>
-              <a:rPr lang="pt-BR" sz="2400" dirty="0"/>
+              <a:rPr lang="pt-BR" sz="2400" b="1" dirty="0"/>
               <a:t>.</a:t>
             </a:r>
           </a:p>
@@ -9577,15 +9290,15 @@
               <a:t>	Do </a:t>
             </a:r>
             <a:r>
-              <a:rPr lang="pt-BR" sz="2400" dirty="0" err="1"/>
+              <a:rPr lang="pt-BR" sz="2400" b="1" dirty="0" err="1"/>
               <a:t>sprint</a:t>
             </a:r>
             <a:r>
-              <a:rPr lang="pt-BR" sz="2400" dirty="0"/>
+              <a:rPr lang="pt-BR" sz="2400" b="1" dirty="0"/>
               <a:t> </a:t>
             </a:r>
             <a:r>
-              <a:rPr lang="pt-BR" sz="2400" dirty="0" err="1"/>
+              <a:rPr lang="pt-BR" sz="2400" b="1" dirty="0" err="1"/>
               <a:t>backlog</a:t>
             </a:r>
             <a:r>
@@ -9593,12 +9306,16 @@
               <a:t>, as atividades são distribuídas entre os membros do </a:t>
             </a:r>
             <a:r>
-              <a:rPr lang="pt-BR" sz="2400" dirty="0" err="1"/>
+              <a:rPr lang="pt-BR" sz="2400" b="1" dirty="0" err="1"/>
               <a:t>Scrum</a:t>
             </a:r>
             <a:r>
+              <a:rPr lang="pt-BR" sz="2400" b="1" dirty="0"/>
+              <a:t> Team</a:t>
+            </a:r>
+            <a:r>
               <a:rPr lang="pt-BR" sz="2400" dirty="0"/>
-              <a:t> Team, que devem desenvolvê-las dentro de um prazo que geralmente não leva mais de quatro semanas.</a:t>
+              <a:t>, que devem desenvolvê-las dentro de um prazo que geralmente não leva mais de quatro semanas.</a:t>
             </a:r>
           </a:p>
           <a:p>
@@ -9616,7 +9333,7 @@
               <a:t>	Ao final de cada </a:t>
             </a:r>
             <a:r>
-              <a:rPr lang="pt-BR" sz="2400" dirty="0" err="1"/>
+              <a:rPr lang="pt-BR" sz="2400" b="1" dirty="0"/>
               <a:t>sprint</a:t>
             </a:r>
             <a:r>
@@ -9624,28 +9341,50 @@
               <a:t> é realizada a </a:t>
             </a:r>
             <a:r>
-              <a:rPr lang="pt-BR" sz="2400" dirty="0" err="1"/>
+              <a:rPr lang="pt-BR" sz="2400" b="1" dirty="0"/>
+              <a:t>sprint review meeting</a:t>
+            </a:r>
+            <a:r>
+              <a:rPr lang="pt-BR" sz="2400" dirty="0"/>
+              <a:t>, uma reunião de alinhamento sobre o que foi entregue. </a:t>
+            </a:r>
+          </a:p>
+          <a:p>
+            <a:pPr marL="0" indent="0" algn="just">
+              <a:buNone/>
+            </a:pPr>
+            <a:endParaRPr lang="pt-BR" sz="2400" dirty="0"/>
+          </a:p>
+          <a:p>
+            <a:pPr marL="0" indent="0" algn="just">
+              <a:buNone/>
+            </a:pPr>
+            <a:r>
+              <a:rPr lang="pt-BR" sz="2400" dirty="0"/>
+              <a:t>	A partir daí, começa-se a planejar a próxima </a:t>
+            </a:r>
+            <a:r>
+              <a:rPr lang="pt-BR" sz="2400" b="1" dirty="0"/>
               <a:t>sprint</a:t>
             </a:r>
             <a:r>
               <a:rPr lang="pt-BR" sz="2400" dirty="0"/>
-              <a:t> </a:t>
-            </a:r>
-            <a:r>
-              <a:rPr lang="pt-BR" sz="2400" dirty="0" err="1"/>
-              <a:t>review</a:t>
-            </a:r>
+              <a:t>. </a:t>
+            </a:r>
+          </a:p>
+          <a:p>
+            <a:pPr marL="0" indent="0" algn="just">
+              <a:buNone/>
+            </a:pPr>
+            <a:endParaRPr lang="pt-BR" sz="2400" dirty="0"/>
+          </a:p>
+          <a:p>
+            <a:pPr marL="0" indent="0" algn="just">
+              <a:buNone/>
+            </a:pPr>
             <a:r>
               <a:rPr lang="pt-BR" sz="2400" dirty="0"/>
-              <a:t> meeting, uma reunião de alinhamento sobre o que foi entregue. A partir daí, começa-se a planejar o próximo </a:t>
-            </a:r>
-            <a:r>
-              <a:rPr lang="pt-BR" sz="2400" dirty="0" err="1"/>
-              <a:t>sprint</a:t>
-            </a:r>
-            <a:r>
-              <a:rPr lang="pt-BR" sz="2400" dirty="0"/>
-              <a:t>. Essas etapas acontecem sucessivamente até que o produto final esteja pronto para a entrega.</a:t>
+              <a:t>	Essas etapas acontecem sucessivamente até que o produto final esteja pronto para a entrega.</a:t>
             </a:r>
           </a:p>
         </p:txBody>
@@ -9778,7 +9517,7 @@
               <a:t>	Diferentemente dos demais métodos ágeis, o </a:t>
             </a:r>
             <a:r>
-              <a:rPr lang="pt-BR" sz="2400" dirty="0" err="1"/>
+              <a:rPr lang="pt-BR" sz="2400" b="1" dirty="0" err="1"/>
               <a:t>Scrum</a:t>
             </a:r>
             <a:r>
@@ -10001,7 +9740,7 @@
           </a:ln>
           <a:extLst>
             <a:ext uri="{C572A759-6A51-4108-AA02-DFA0A04FC94B}">
-              <ma14:wrappingTextBoxFlag xmlns:ma14="http://schemas.microsoft.com/office/mac/drawingml/2011/main" xmlns="" val="1"/>
+              <ma14:wrappingTextBoxFlag xmlns="" xmlns:ma14="http://schemas.microsoft.com/office/mac/drawingml/2011/main" val="1"/>
             </a:ext>
           </a:extLst>
         </p:spPr>
@@ -10364,23 +10103,7 @@
                   <a:srgbClr val="0070C0"/>
                 </a:solidFill>
               </a:rPr>
-              <a:t>Conceitos</a:t>
-            </a:r>
-            <a:r>
-              <a:rPr lang="en-US" b="1" dirty="0">
-                <a:solidFill>
-                  <a:srgbClr val="0070C0"/>
-                </a:solidFill>
-              </a:rPr>
-              <a:t> </a:t>
-            </a:r>
-            <a:r>
-              <a:rPr lang="en-US" b="1" dirty="0" err="1">
-                <a:solidFill>
-                  <a:srgbClr val="0070C0"/>
-                </a:solidFill>
-              </a:rPr>
-              <a:t>em</a:t>
+              <a:t>Introdução</a:t>
             </a:r>
             <a:r>
               <a:rPr lang="en-US" b="1" dirty="0">
@@ -10574,23 +10297,7 @@
                   <a:srgbClr val="0070C0"/>
                 </a:solidFill>
               </a:rPr>
-              <a:t>Conceitos</a:t>
-            </a:r>
-            <a:r>
-              <a:rPr lang="en-US" b="1" dirty="0">
-                <a:solidFill>
-                  <a:srgbClr val="0070C0"/>
-                </a:solidFill>
-              </a:rPr>
-              <a:t> </a:t>
-            </a:r>
-            <a:r>
-              <a:rPr lang="en-US" b="1" dirty="0" err="1">
-                <a:solidFill>
-                  <a:srgbClr val="0070C0"/>
-                </a:solidFill>
-              </a:rPr>
-              <a:t>em</a:t>
+              <a:t>Introdução</a:t>
             </a:r>
             <a:r>
               <a:rPr lang="en-US" b="1" dirty="0">
@@ -10622,12 +10329,12 @@
         <p:spPr>
           <a:xfrm>
             <a:off x="457200" y="1600200"/>
-            <a:ext cx="8572500" cy="4525963"/>
+            <a:ext cx="8572500" cy="4983162"/>
           </a:xfrm>
         </p:spPr>
         <p:txBody>
           <a:bodyPr>
-            <a:normAutofit/>
+            <a:noAutofit/>
           </a:bodyPr>
           <a:lstStyle/>
           <a:p>
@@ -10635,89 +10342,151 @@
               <a:buNone/>
             </a:pPr>
             <a:r>
-              <a:rPr lang="pt-BR" dirty="0"/>
-              <a:t>	O </a:t>
-            </a:r>
-            <a:r>
-              <a:rPr lang="pt-BR" b="1" i="1" dirty="0"/>
+              <a:rPr lang="pt-BR" sz="2200" b="1" dirty="0"/>
+              <a:t>	Engenharia de </a:t>
+            </a:r>
+            <a:r>
+              <a:rPr lang="pt-BR" sz="2200" b="1" i="1" dirty="0"/>
               <a:t>software</a:t>
             </a:r>
             <a:r>
-              <a:rPr lang="pt-BR" dirty="0"/>
-              <a:t> estão categorizados em seguintes tipos, tais como (PRESSMAN, 2006) :</a:t>
+              <a:rPr lang="pt-BR" sz="2200" dirty="0"/>
+              <a:t> é uma abordagem sistemática e disciplinada para o desenvolvimento de </a:t>
+            </a:r>
+            <a:r>
+              <a:rPr lang="pt-BR" sz="2200" i="1" dirty="0"/>
+              <a:t>software</a:t>
+            </a:r>
+            <a:r>
+              <a:rPr lang="pt-BR" sz="2200" dirty="0"/>
+              <a:t> (PRESSMAN, 2006).</a:t>
             </a:r>
           </a:p>
           <a:p>
             <a:pPr marL="0" indent="0" algn="just">
               <a:buNone/>
             </a:pPr>
-            <a:endParaRPr lang="pt-BR" dirty="0"/>
-          </a:p>
-          <a:p>
-            <a:pPr algn="just">
-              <a:buFont typeface="Wingdings" pitchFamily="2" charset="2"/>
-              <a:buChar char="q"/>
+            <a:r>
+              <a:rPr lang="pt-BR" sz="2200" dirty="0"/>
+              <a:t>Uma das grandes dificuldades da engenharia do </a:t>
+            </a:r>
+            <a:r>
+              <a:rPr lang="pt-BR" sz="2200" i="1" dirty="0"/>
+              <a:t>software</a:t>
+            </a:r>
+            <a:r>
+              <a:rPr lang="pt-BR" sz="2200" dirty="0"/>
+              <a:t> é resolver o problema e deixar o cliente satisfeito com o </a:t>
+            </a:r>
+            <a:r>
+              <a:rPr lang="pt-BR" sz="2200" i="1" dirty="0"/>
+              <a:t>software</a:t>
+            </a:r>
+            <a:r>
+              <a:rPr lang="pt-BR" sz="2200" dirty="0"/>
+              <a:t> (JALOTE, 2005).</a:t>
+            </a:r>
+          </a:p>
+          <a:p>
+            <a:pPr marL="0" indent="0" algn="just">
+              <a:buNone/>
             </a:pPr>
-            <a:r>
-              <a:rPr lang="pt-BR" b="1" i="1" dirty="0"/>
-              <a:t>Software</a:t>
-            </a:r>
-            <a:r>
-              <a:rPr lang="pt-BR" b="1" dirty="0"/>
-              <a:t> de sistema.</a:t>
-            </a:r>
-            <a:r>
-              <a:rPr lang="pt-BR" dirty="0"/>
-              <a:t> São programas que </a:t>
-            </a:r>
-            <a:r>
-              <a:rPr lang="pt-BR" dirty="0" err="1"/>
-              <a:t>apóiam</a:t>
-            </a:r>
-            <a:r>
-              <a:rPr lang="pt-BR" dirty="0"/>
-              <a:t> outros programas, como o </a:t>
-            </a:r>
-            <a:r>
-              <a:rPr lang="pt-BR" i="1" dirty="0"/>
+            <a:endParaRPr lang="pt-BR" sz="2200" dirty="0"/>
+          </a:p>
+          <a:p>
+            <a:pPr marL="0" indent="0" algn="just">
+              <a:buNone/>
+            </a:pPr>
+            <a:r>
+              <a:rPr lang="pt-BR" sz="2200" dirty="0"/>
+              <a:t>	A </a:t>
+            </a:r>
+            <a:r>
+              <a:rPr lang="pt-BR" sz="2200" b="1" dirty="0"/>
+              <a:t>engenharia de </a:t>
+            </a:r>
+            <a:r>
+              <a:rPr lang="pt-BR" sz="2200" b="1" i="1" dirty="0"/>
               <a:t>software</a:t>
             </a:r>
             <a:r>
-              <a:rPr lang="pt-BR" dirty="0"/>
-              <a:t> que realiza a comunicação com o </a:t>
-            </a:r>
-            <a:r>
-              <a:rPr lang="pt-BR" i="1" dirty="0"/>
-              <a:t>hardware</a:t>
-            </a:r>
-            <a:r>
-              <a:rPr lang="pt-BR" dirty="0"/>
-              <a:t> (sistema operacional) e </a:t>
-            </a:r>
-            <a:r>
-              <a:rPr lang="pt-BR" i="1" dirty="0"/>
+              <a:rPr lang="pt-BR" sz="2200" dirty="0"/>
+              <a:t> foca no </a:t>
+            </a:r>
+            <a:r>
+              <a:rPr lang="pt-BR" sz="2200" i="1" dirty="0"/>
               <a:t>software</a:t>
             </a:r>
             <a:r>
-              <a:rPr lang="pt-BR" dirty="0"/>
-              <a:t> que ajuda na construção de outro </a:t>
-            </a:r>
-            <a:r>
-              <a:rPr lang="pt-BR" i="1" dirty="0"/>
+              <a:rPr lang="pt-BR" sz="2200" dirty="0"/>
+              <a:t> como produto. Não entra neste escopo, os </a:t>
+            </a:r>
+            <a:r>
+              <a:rPr lang="pt-BR" sz="2200" i="1" dirty="0"/>
+              <a:t>softwares</a:t>
+            </a:r>
+            <a:r>
+              <a:rPr lang="pt-BR" sz="2200" dirty="0"/>
+              <a:t> construídos apenas para passarem o tempo dos programadores (PAULA FILHO, 2009).</a:t>
+            </a:r>
+          </a:p>
+          <a:p>
+            <a:pPr marL="0" indent="0" algn="just">
+              <a:buNone/>
+            </a:pPr>
+            <a:endParaRPr lang="pt-BR" sz="2200" dirty="0"/>
+          </a:p>
+          <a:p>
+            <a:pPr marL="0" indent="0" algn="just">
+              <a:buNone/>
+            </a:pPr>
+            <a:r>
+              <a:rPr lang="pt-BR" sz="2200" dirty="0"/>
+              <a:t>	No </a:t>
+            </a:r>
+            <a:r>
+              <a:rPr lang="pt-BR" sz="2200" b="1" dirty="0"/>
+              <a:t>desenvolvimento de um projeto de </a:t>
+            </a:r>
+            <a:r>
+              <a:rPr lang="pt-BR" sz="2200" b="1" i="1" dirty="0"/>
               <a:t>software</a:t>
             </a:r>
             <a:r>
-              <a:rPr lang="pt-BR" dirty="0"/>
-              <a:t> (compiladores);</a:t>
-            </a:r>
-            <a:endParaRPr lang="en-US" dirty="0"/>
+              <a:rPr lang="pt-BR" sz="2200" dirty="0"/>
+              <a:t> quanto mais complexo é o </a:t>
+            </a:r>
+            <a:r>
+              <a:rPr lang="pt-BR" sz="2200" i="1" dirty="0"/>
+              <a:t>software</a:t>
+            </a:r>
+            <a:r>
+              <a:rPr lang="pt-BR" sz="2200" dirty="0"/>
+              <a:t>, maior é o empenho que o engenheiro de </a:t>
+            </a:r>
+            <a:r>
+              <a:rPr lang="pt-BR" sz="2200" i="1" dirty="0"/>
+              <a:t>software</a:t>
+            </a:r>
+            <a:r>
+              <a:rPr lang="pt-BR" sz="2200" dirty="0"/>
+              <a:t> deve fazer para desenvolver e tem que ter maior gerenciamento</a:t>
+            </a:r>
+            <a:r>
+              <a:rPr lang="pt-BR" sz="2200" b="1" dirty="0"/>
+              <a:t> </a:t>
+            </a:r>
+            <a:r>
+              <a:rPr lang="pt-BR" sz="2200" dirty="0"/>
+              <a:t>(JALOTE, 2005).</a:t>
+            </a:r>
           </a:p>
         </p:txBody>
       </p:sp>
     </p:spTree>
     <p:extLst>
       <p:ext uri="{BB962C8B-B14F-4D97-AF65-F5344CB8AC3E}">
-        <p14:creationId xmlns:p14="http://schemas.microsoft.com/office/powerpoint/2010/main" val="3265622306"/>
+        <p14:creationId xmlns:p14="http://schemas.microsoft.com/office/powerpoint/2010/main" val="2986393598"/>
       </p:ext>
     </p:extLst>
   </p:cSld>
@@ -10777,23 +10546,7 @@
                   <a:srgbClr val="0070C0"/>
                 </a:solidFill>
               </a:rPr>
-              <a:t>Conceitos</a:t>
-            </a:r>
-            <a:r>
-              <a:rPr lang="en-US" b="1" dirty="0">
-                <a:solidFill>
-                  <a:srgbClr val="0070C0"/>
-                </a:solidFill>
-              </a:rPr>
-              <a:t> </a:t>
-            </a:r>
-            <a:r>
-              <a:rPr lang="en-US" b="1" dirty="0" err="1">
-                <a:solidFill>
-                  <a:srgbClr val="0070C0"/>
-                </a:solidFill>
-              </a:rPr>
-              <a:t>em</a:t>
+              <a:t>Atividades</a:t>
             </a:r>
             <a:r>
               <a:rPr lang="en-US" b="1" dirty="0">
@@ -10830,81 +10583,183 @@
         </p:spPr>
         <p:txBody>
           <a:bodyPr>
-            <a:normAutofit lnSpcReduction="10000"/>
+            <a:noAutofit/>
           </a:bodyPr>
           <a:lstStyle/>
           <a:p>
-            <a:pPr algn="just">
-              <a:buFont typeface="Wingdings" pitchFamily="2" charset="2"/>
-              <a:buChar char="q"/>
+            <a:pPr marL="0" indent="0" algn="just">
+              <a:buNone/>
             </a:pPr>
             <a:r>
-              <a:rPr lang="pt-BR" b="1" i="1" dirty="0"/>
-              <a:t>Software</a:t>
-            </a:r>
-            <a:r>
-              <a:rPr lang="pt-BR" b="1" dirty="0"/>
-              <a:t> de aplicação.</a:t>
-            </a:r>
-            <a:r>
-              <a:rPr lang="pt-BR" dirty="0"/>
-              <a:t> São programas que são desenvolvidos para executar no negocio de uma empresa determinada;</a:t>
-            </a:r>
+              <a:rPr lang="pt-BR" sz="1800" b="1" dirty="0"/>
+              <a:t>	Engenharia de </a:t>
+            </a:r>
+            <a:r>
+              <a:rPr lang="pt-BR" sz="1800" b="1" i="1" dirty="0"/>
+              <a:t>software</a:t>
+            </a:r>
+            <a:r>
+              <a:rPr lang="pt-BR" sz="1800" dirty="0"/>
+              <a:t> são conjuntos de atividades para o processo de desenvolvimento de </a:t>
+            </a:r>
+            <a:r>
+              <a:rPr lang="pt-BR" sz="1800" i="1" dirty="0"/>
+              <a:t>software</a:t>
+            </a:r>
+            <a:r>
+              <a:rPr lang="pt-BR" sz="1800" dirty="0"/>
+              <a:t>. Estas atividades, são: analise de requisitos, design do </a:t>
+            </a:r>
+            <a:r>
+              <a:rPr lang="pt-BR" sz="1800" i="1" dirty="0"/>
+              <a:t>software</a:t>
+            </a:r>
+            <a:r>
+              <a:rPr lang="pt-BR" sz="1800" dirty="0"/>
+              <a:t>, código e teste, </a:t>
+            </a:r>
+            <a:r>
+              <a:rPr lang="pt-BR" sz="1800" dirty="0" err="1"/>
+              <a:t>etc</a:t>
+            </a:r>
+            <a:r>
+              <a:rPr lang="pt-BR" sz="1800" dirty="0"/>
+              <a:t> (JALOTE, 2005).</a:t>
+            </a:r>
+          </a:p>
+          <a:p>
+            <a:pPr marL="0" indent="0" algn="just">
+              <a:buNone/>
+            </a:pPr>
+            <a:endParaRPr lang="pt-BR" sz="1800" dirty="0"/>
           </a:p>
           <a:p>
             <a:pPr algn="just"/>
-            <a:endParaRPr lang="pt-BR" dirty="0"/>
-          </a:p>
-          <a:p>
-            <a:pPr algn="just">
-              <a:buFont typeface="Wingdings" pitchFamily="2" charset="2"/>
-              <a:buChar char="q"/>
-            </a:pPr>
-            <a:r>
-              <a:rPr lang="pt-BR" b="1" i="1" dirty="0"/>
-              <a:t>Software</a:t>
-            </a:r>
-            <a:r>
-              <a:rPr lang="pt-BR" b="1" dirty="0"/>
-              <a:t> cientifico e de engenharia.</a:t>
-            </a:r>
-            <a:r>
-              <a:rPr lang="pt-BR" dirty="0"/>
-              <a:t> São algoritmos que processam números;</a:t>
-            </a:r>
-          </a:p>
-          <a:p>
-            <a:pPr algn="just">
-              <a:buFont typeface="Wingdings" pitchFamily="2" charset="2"/>
-              <a:buChar char="q"/>
-            </a:pPr>
-            <a:endParaRPr lang="pt-BR" dirty="0"/>
-          </a:p>
-          <a:p>
-            <a:pPr algn="just">
-              <a:buFont typeface="Wingdings" pitchFamily="2" charset="2"/>
-              <a:buChar char="q"/>
-            </a:pPr>
-            <a:r>
-              <a:rPr lang="pt-BR" b="1" i="1" dirty="0"/>
-              <a:t>Software</a:t>
-            </a:r>
-            <a:r>
-              <a:rPr lang="pt-BR" b="1" dirty="0"/>
-              <a:t> embutido.</a:t>
-            </a:r>
-            <a:r>
-              <a:rPr lang="pt-BR" dirty="0"/>
-              <a:t> São programas construídos para executarem dentro de um produto especifico como a teclas digitais de um forno micro ondas;</a:t>
-            </a:r>
-            <a:endParaRPr lang="en-US" dirty="0"/>
+            <a:r>
+              <a:rPr lang="pt-BR" sz="1800" b="1" dirty="0"/>
+              <a:t>Analise de requisitos. </a:t>
+            </a:r>
+            <a:r>
+              <a:rPr lang="pt-BR" sz="1800" dirty="0"/>
+              <a:t>Através da análise de requisitos é o momento onde efetua o conhecimento do problema para desenvolve o </a:t>
+            </a:r>
+            <a:r>
+              <a:rPr lang="pt-BR" sz="1800" i="1" dirty="0"/>
+              <a:t>software</a:t>
+            </a:r>
+            <a:r>
+              <a:rPr lang="pt-BR" sz="1800" dirty="0"/>
+              <a:t> (JALOTE, 2005).</a:t>
+            </a:r>
+            <a:r>
+              <a:rPr lang="pt-BR" sz="1800" b="1" dirty="0"/>
+              <a:t> </a:t>
+            </a:r>
+            <a:endParaRPr lang="pt-BR" sz="1800" dirty="0"/>
+          </a:p>
+          <a:p>
+            <a:pPr algn="just"/>
+            <a:r>
+              <a:rPr lang="pt-BR" sz="1800" b="1" dirty="0"/>
+              <a:t>Design do </a:t>
+            </a:r>
+            <a:r>
+              <a:rPr lang="pt-BR" sz="1800" b="1" i="1" dirty="0"/>
+              <a:t>software</a:t>
+            </a:r>
+            <a:r>
+              <a:rPr lang="pt-BR" sz="1800" b="1" dirty="0"/>
+              <a:t>. </a:t>
+            </a:r>
+            <a:r>
+              <a:rPr lang="pt-BR" sz="1800" dirty="0"/>
+              <a:t>Pelo design do </a:t>
+            </a:r>
+            <a:r>
+              <a:rPr lang="pt-BR" sz="1800" i="1" dirty="0"/>
+              <a:t>software</a:t>
+            </a:r>
+            <a:r>
+              <a:rPr lang="pt-BR" sz="1800" dirty="0"/>
+              <a:t> é o momento que o engenheiro de </a:t>
+            </a:r>
+            <a:r>
+              <a:rPr lang="pt-BR" sz="1800" i="1" dirty="0"/>
+              <a:t>software</a:t>
+            </a:r>
+            <a:r>
+              <a:rPr lang="pt-BR" sz="1800" dirty="0"/>
+              <a:t> realiza o planejamento da solução do problema que foi levantado no documento de requisito (JALOTE, 2005). </a:t>
+            </a:r>
+          </a:p>
+          <a:p>
+            <a:pPr algn="just"/>
+            <a:r>
+              <a:rPr lang="pt-BR" sz="1800" b="1" dirty="0"/>
+              <a:t>Codificação. </a:t>
+            </a:r>
+            <a:r>
+              <a:rPr lang="pt-BR" sz="1800" dirty="0"/>
+              <a:t>A codificação é o momento que pega o problema resolvido no design do </a:t>
+            </a:r>
+            <a:r>
+              <a:rPr lang="pt-BR" sz="1800" i="1" dirty="0"/>
+              <a:t>software</a:t>
+            </a:r>
+            <a:r>
+              <a:rPr lang="pt-BR" sz="1800" dirty="0"/>
+              <a:t> e transformará em uma linguagem de programação (JALOTE, 2005). </a:t>
+            </a:r>
+          </a:p>
+          <a:p>
+            <a:pPr algn="just"/>
+            <a:r>
+              <a:rPr lang="pt-BR" sz="1800" b="1" dirty="0"/>
+              <a:t>Teste. </a:t>
+            </a:r>
+            <a:r>
+              <a:rPr lang="pt-BR" sz="1800" dirty="0"/>
+              <a:t>O teste de </a:t>
+            </a:r>
+            <a:r>
+              <a:rPr lang="pt-BR" sz="1800" i="1" dirty="0"/>
+              <a:t>software</a:t>
+            </a:r>
+            <a:r>
+              <a:rPr lang="pt-BR" sz="1800" dirty="0"/>
+              <a:t> é o processo tem a intenção de encontrar defeitos nos artefatos de </a:t>
+            </a:r>
+            <a:r>
+              <a:rPr lang="pt-BR" sz="1800" i="1" dirty="0"/>
+              <a:t>software</a:t>
+            </a:r>
+            <a:r>
+              <a:rPr lang="pt-BR" sz="1800" dirty="0"/>
+              <a:t> (MYERS, 2004). O teste é uma maneira de medir o controle da qualidade do </a:t>
+            </a:r>
+            <a:r>
+              <a:rPr lang="pt-BR" sz="1800" i="1" dirty="0"/>
+              <a:t>software</a:t>
+            </a:r>
+            <a:r>
+              <a:rPr lang="pt-BR" sz="1800" dirty="0"/>
+              <a:t> durante o desenvolvimento de </a:t>
+            </a:r>
+            <a:r>
+              <a:rPr lang="pt-BR" sz="1800" i="1" dirty="0"/>
+              <a:t>software</a:t>
+            </a:r>
+            <a:r>
+              <a:rPr lang="pt-BR" sz="1800" dirty="0"/>
+              <a:t> (JALOTE, 2005).</a:t>
+            </a:r>
           </a:p>
         </p:txBody>
       </p:sp>
     </p:spTree>
     <p:extLst>
       <p:ext uri="{BB962C8B-B14F-4D97-AF65-F5344CB8AC3E}">
-        <p14:creationId xmlns:p14="http://schemas.microsoft.com/office/powerpoint/2010/main" val="1285958173"/>
+        <p14:creationId xmlns:p14="http://schemas.microsoft.com/office/powerpoint/2010/main" val="1176447797"/>
       </p:ext>
     </p:extLst>
   </p:cSld>
@@ -10964,7 +10819,7 @@
                   <a:srgbClr val="0070C0"/>
                 </a:solidFill>
               </a:rPr>
-              <a:t>Conceitos</a:t>
+              <a:t>Definição</a:t>
             </a:r>
             <a:r>
               <a:rPr lang="en-US" b="1" dirty="0">
@@ -10972,23 +10827,7 @@
                   <a:srgbClr val="0070C0"/>
                 </a:solidFill>
               </a:rPr>
-              <a:t> </a:t>
-            </a:r>
-            <a:r>
-              <a:rPr lang="en-US" b="1" dirty="0" err="1">
-                <a:solidFill>
-                  <a:srgbClr val="0070C0"/>
-                </a:solidFill>
-              </a:rPr>
-              <a:t>em</a:t>
-            </a:r>
-            <a:r>
-              <a:rPr lang="en-US" b="1" dirty="0">
-                <a:solidFill>
-                  <a:srgbClr val="0070C0"/>
-                </a:solidFill>
-              </a:rPr>
-              <a:t> Eng. De Software</a:t>
+              <a:t> De Software</a:t>
             </a:r>
           </a:p>
         </p:txBody>
@@ -11021,7 +10860,30 @@
           </a:bodyPr>
           <a:lstStyle/>
           <a:p>
-            <a:pPr>
+            <a:pPr marL="0" indent="0" algn="just">
+              <a:buNone/>
+            </a:pPr>
+            <a:r>
+              <a:rPr lang="pt-BR" dirty="0"/>
+              <a:t>	O </a:t>
+            </a:r>
+            <a:r>
+              <a:rPr lang="pt-BR" b="1" i="1" dirty="0"/>
+              <a:t>software</a:t>
+            </a:r>
+            <a:r>
+              <a:rPr lang="pt-BR" dirty="0"/>
+              <a:t> estão categorizados em seguintes tipos, tais como (PRESSMAN, 2006) :</a:t>
+            </a:r>
+          </a:p>
+          <a:p>
+            <a:pPr marL="0" indent="0" algn="just">
+              <a:buNone/>
+            </a:pPr>
+            <a:endParaRPr lang="pt-BR" dirty="0"/>
+          </a:p>
+          <a:p>
+            <a:pPr algn="just">
               <a:buFont typeface="Wingdings" pitchFamily="2" charset="2"/>
               <a:buChar char="q"/>
             </a:pPr>
@@ -11031,11 +10893,19 @@
             </a:r>
             <a:r>
               <a:rPr lang="pt-BR" b="1" dirty="0"/>
-              <a:t> para linhas de produtos.</a:t>
+              <a:t> de sistema.</a:t>
             </a:r>
             <a:r>
               <a:rPr lang="pt-BR" dirty="0"/>
-              <a:t> São os softwares conhecidos como </a:t>
+              <a:t> São programas que </a:t>
+            </a:r>
+            <a:r>
+              <a:rPr lang="pt-BR" dirty="0" err="1"/>
+              <a:t>apóiam</a:t>
+            </a:r>
+            <a:r>
+              <a:rPr lang="pt-BR" dirty="0"/>
+              <a:t> outros programas, como o </a:t>
             </a:r>
             <a:r>
               <a:rPr lang="pt-BR" i="1" dirty="0"/>
@@ -11043,74 +10913,15 @@
             </a:r>
             <a:r>
               <a:rPr lang="pt-BR" dirty="0"/>
-              <a:t> de prateleiras;</a:t>
-            </a:r>
-          </a:p>
-          <a:p>
-            <a:pPr marL="0" indent="0">
-              <a:buNone/>
-            </a:pPr>
+              <a:t> que realiza a comunicação com o </a:t>
+            </a:r>
+            <a:r>
+              <a:rPr lang="pt-BR" i="1" dirty="0"/>
+              <a:t>hardware</a:t>
+            </a:r>
             <a:r>
               <a:rPr lang="pt-BR" dirty="0"/>
-              <a:t> </a:t>
-            </a:r>
-          </a:p>
-          <a:p>
-            <a:pPr>
-              <a:buFont typeface="Wingdings" pitchFamily="2" charset="2"/>
-              <a:buChar char="q"/>
-            </a:pPr>
-            <a:r>
-              <a:rPr lang="pt-BR" b="1" i="1" dirty="0"/>
-              <a:t>Software</a:t>
-            </a:r>
-            <a:r>
-              <a:rPr lang="pt-BR" b="1" dirty="0"/>
-              <a:t> de </a:t>
-            </a:r>
-            <a:r>
-              <a:rPr lang="pt-BR" b="1" i="1" dirty="0"/>
-              <a:t>web</a:t>
-            </a:r>
-            <a:r>
-              <a:rPr lang="pt-BR" b="1" dirty="0"/>
-              <a:t>.</a:t>
-            </a:r>
-            <a:r>
-              <a:rPr lang="pt-BR" dirty="0"/>
-              <a:t> São aplicativos que são executados via Internet;</a:t>
-            </a:r>
-          </a:p>
-          <a:p>
-            <a:pPr marL="0" indent="0">
-              <a:buNone/>
-            </a:pPr>
-            <a:endParaRPr lang="pt-BR" dirty="0"/>
-          </a:p>
-          <a:p>
-            <a:pPr>
-              <a:buFont typeface="Wingdings" pitchFamily="2" charset="2"/>
-              <a:buChar char="q"/>
-            </a:pPr>
-            <a:r>
-              <a:rPr lang="pt-BR" b="1" i="1" dirty="0"/>
-              <a:t>Software</a:t>
-            </a:r>
-            <a:r>
-              <a:rPr lang="pt-BR" b="1" dirty="0"/>
-              <a:t> de inteligência artificial.</a:t>
-            </a:r>
-            <a:r>
-              <a:rPr lang="pt-BR" dirty="0"/>
-              <a:t> São </a:t>
-            </a:r>
-            <a:r>
-              <a:rPr lang="pt-BR" i="1" dirty="0"/>
-              <a:t>softwares</a:t>
-            </a:r>
-            <a:r>
-              <a:rPr lang="pt-BR" dirty="0"/>
-              <a:t> que fazem os usos de algoritmos não numéricos. Estes tipos </a:t>
+              <a:t> (sistema operacional) e </a:t>
             </a:r>
             <a:r>
               <a:rPr lang="pt-BR" i="1" dirty="0"/>
@@ -11118,7 +10929,15 @@
             </a:r>
             <a:r>
               <a:rPr lang="pt-BR" dirty="0"/>
-              <a:t> se encaixam na robótica;</a:t>
+              <a:t> que ajuda na construção de outro </a:t>
+            </a:r>
+            <a:r>
+              <a:rPr lang="pt-BR" i="1" dirty="0"/>
+              <a:t>software</a:t>
+            </a:r>
+            <a:r>
+              <a:rPr lang="pt-BR" dirty="0"/>
+              <a:t> (compiladores);</a:t>
             </a:r>
             <a:endParaRPr lang="en-US" dirty="0"/>
           </a:p>
@@ -11127,7 +10946,7 @@
     </p:spTree>
     <p:extLst>
       <p:ext uri="{BB962C8B-B14F-4D97-AF65-F5344CB8AC3E}">
-        <p14:creationId xmlns:p14="http://schemas.microsoft.com/office/powerpoint/2010/main" val="1285958173"/>
+        <p14:creationId xmlns:p14="http://schemas.microsoft.com/office/powerpoint/2010/main" val="3265622306"/>
       </p:ext>
     </p:extLst>
   </p:cSld>
@@ -11187,7 +11006,7 @@
                   <a:srgbClr val="0070C0"/>
                 </a:solidFill>
               </a:rPr>
-              <a:t>Conceitos</a:t>
+              <a:t>Definição</a:t>
             </a:r>
             <a:r>
               <a:rPr lang="en-US" b="1" dirty="0">
@@ -11195,23 +11014,7 @@
                   <a:srgbClr val="0070C0"/>
                 </a:solidFill>
               </a:rPr>
-              <a:t> </a:t>
-            </a:r>
-            <a:r>
-              <a:rPr lang="en-US" b="1" dirty="0" err="1">
-                <a:solidFill>
-                  <a:srgbClr val="0070C0"/>
-                </a:solidFill>
-              </a:rPr>
-              <a:t>em</a:t>
-            </a:r>
-            <a:r>
-              <a:rPr lang="en-US" b="1" dirty="0">
-                <a:solidFill>
-                  <a:srgbClr val="0070C0"/>
-                </a:solidFill>
-              </a:rPr>
-              <a:t> Eng. De Software</a:t>
+              <a:t> De Software</a:t>
             </a:r>
           </a:p>
         </p:txBody>
@@ -11240,7 +11043,7 @@
         </p:spPr>
         <p:txBody>
           <a:bodyPr>
-            <a:normAutofit/>
+            <a:normAutofit lnSpcReduction="10000"/>
           </a:bodyPr>
           <a:lstStyle/>
           <a:p>
@@ -11250,37 +11053,19 @@
             </a:pPr>
             <a:r>
               <a:rPr lang="pt-BR" b="1" i="1" dirty="0"/>
-              <a:t>Computação ubíqua</a:t>
+              <a:t>Software</a:t>
             </a:r>
             <a:r>
               <a:rPr lang="pt-BR" b="1" dirty="0"/>
-              <a:t>. </a:t>
+              <a:t> de aplicação.</a:t>
             </a:r>
             <a:r>
               <a:rPr lang="pt-BR" dirty="0"/>
-              <a:t>São </a:t>
-            </a:r>
-            <a:r>
-              <a:rPr lang="pt-BR" i="1" dirty="0"/>
-              <a:t>softwares</a:t>
-            </a:r>
-            <a:r>
-              <a:rPr lang="pt-BR" dirty="0"/>
-              <a:t> que realiza a verdadeira computação distribuída;</a:t>
-            </a:r>
-          </a:p>
-          <a:p>
-            <a:pPr marL="0" indent="0" algn="just">
-              <a:buNone/>
-            </a:pPr>
-            <a:r>
-              <a:rPr lang="pt-BR" dirty="0"/>
-              <a:t> </a:t>
-            </a:r>
-            <a:r>
-              <a:rPr lang="pt-BR" b="1" dirty="0"/>
-              <a:t> </a:t>
-            </a:r>
+              <a:t> São programas que são desenvolvidos para executar no negócio de uma empresa determinada;</a:t>
+            </a:r>
+          </a:p>
+          <a:p>
+            <a:pPr algn="just"/>
             <a:endParaRPr lang="pt-BR" dirty="0"/>
           </a:p>
           <a:p>
@@ -11294,35 +11079,45 @@
             </a:r>
             <a:r>
               <a:rPr lang="pt-BR" b="1" dirty="0"/>
-              <a:t> aberto. </a:t>
+              <a:t> científico e de engenharia.</a:t>
             </a:r>
             <a:r>
               <a:rPr lang="pt-BR" dirty="0"/>
-              <a:t>São </a:t>
-            </a:r>
-            <a:r>
-              <a:rPr lang="pt-BR" i="1" dirty="0"/>
-              <a:t>software</a:t>
+              <a:t> São algoritmos que processam números;</a:t>
+            </a:r>
+          </a:p>
+          <a:p>
+            <a:pPr algn="just">
+              <a:buFont typeface="Wingdings" pitchFamily="2" charset="2"/>
+              <a:buChar char="q"/>
+            </a:pPr>
+            <a:endParaRPr lang="pt-BR" dirty="0"/>
+          </a:p>
+          <a:p>
+            <a:pPr algn="just">
+              <a:buFont typeface="Wingdings" pitchFamily="2" charset="2"/>
+              <a:buChar char="q"/>
+            </a:pPr>
+            <a:r>
+              <a:rPr lang="pt-BR" b="1" i="1" dirty="0"/>
+              <a:t>Software</a:t>
+            </a:r>
+            <a:r>
+              <a:rPr lang="pt-BR" b="1" dirty="0"/>
+              <a:t> embutido.</a:t>
             </a:r>
             <a:r>
               <a:rPr lang="pt-BR" dirty="0"/>
-              <a:t> que disponibiliza a visualização do código fonte da aplicação para o engenheiro de </a:t>
-            </a:r>
-            <a:r>
-              <a:rPr lang="pt-BR" i="1" dirty="0"/>
-              <a:t>software</a:t>
-            </a:r>
-            <a:r>
-              <a:rPr lang="pt-BR" dirty="0"/>
-              <a:t> modifica da maneira que deseja;</a:t>
-            </a:r>
+              <a:t> São programas construídos para executarem dentro de um produto especifico como a teclas digitais de um forno micro ondas;</a:t>
+            </a:r>
+            <a:endParaRPr lang="en-US" dirty="0"/>
           </a:p>
         </p:txBody>
       </p:sp>
     </p:spTree>
     <p:extLst>
       <p:ext uri="{BB962C8B-B14F-4D97-AF65-F5344CB8AC3E}">
-        <p14:creationId xmlns:p14="http://schemas.microsoft.com/office/powerpoint/2010/main" val="3472221676"/>
+        <p14:creationId xmlns:p14="http://schemas.microsoft.com/office/powerpoint/2010/main" val="1285958173"/>
       </p:ext>
     </p:extLst>
   </p:cSld>
@@ -11382,7 +11177,7 @@
                   <a:srgbClr val="0070C0"/>
                 </a:solidFill>
               </a:rPr>
-              <a:t>Conceitos</a:t>
+              <a:t>Definição</a:t>
             </a:r>
             <a:r>
               <a:rPr lang="en-US" b="1" dirty="0">
@@ -11390,23 +11185,7 @@
                   <a:srgbClr val="0070C0"/>
                 </a:solidFill>
               </a:rPr>
-              <a:t> </a:t>
-            </a:r>
-            <a:r>
-              <a:rPr lang="en-US" b="1" dirty="0" err="1">
-                <a:solidFill>
-                  <a:srgbClr val="0070C0"/>
-                </a:solidFill>
-              </a:rPr>
-              <a:t>em</a:t>
-            </a:r>
-            <a:r>
-              <a:rPr lang="en-US" b="1" dirty="0">
-                <a:solidFill>
-                  <a:srgbClr val="0070C0"/>
-                </a:solidFill>
-              </a:rPr>
-              <a:t> Eng. De Software</a:t>
+              <a:t> De Software</a:t>
             </a:r>
           </a:p>
         </p:txBody>
@@ -11439,6 +11218,73 @@
           </a:bodyPr>
           <a:lstStyle/>
           <a:p>
+            <a:pPr>
+              <a:buFont typeface="Wingdings" pitchFamily="2" charset="2"/>
+              <a:buChar char="q"/>
+            </a:pPr>
+            <a:r>
+              <a:rPr lang="pt-BR" b="1" i="1" dirty="0"/>
+              <a:t>Software</a:t>
+            </a:r>
+            <a:r>
+              <a:rPr lang="pt-BR" b="1" dirty="0"/>
+              <a:t> para linhas de produtos.</a:t>
+            </a:r>
+            <a:r>
+              <a:rPr lang="pt-BR" dirty="0"/>
+              <a:t> São os softwares conhecidos como </a:t>
+            </a:r>
+            <a:r>
+              <a:rPr lang="pt-BR" i="1" dirty="0"/>
+              <a:t>software</a:t>
+            </a:r>
+            <a:r>
+              <a:rPr lang="pt-BR" dirty="0"/>
+              <a:t> de prateleiras;</a:t>
+            </a:r>
+          </a:p>
+          <a:p>
+            <a:pPr marL="0" indent="0">
+              <a:buNone/>
+            </a:pPr>
+            <a:r>
+              <a:rPr lang="pt-BR" dirty="0"/>
+              <a:t> </a:t>
+            </a:r>
+          </a:p>
+          <a:p>
+            <a:pPr>
+              <a:buFont typeface="Wingdings" pitchFamily="2" charset="2"/>
+              <a:buChar char="q"/>
+            </a:pPr>
+            <a:r>
+              <a:rPr lang="pt-BR" b="1" i="1" dirty="0"/>
+              <a:t>Software</a:t>
+            </a:r>
+            <a:r>
+              <a:rPr lang="pt-BR" b="1" dirty="0"/>
+              <a:t> de </a:t>
+            </a:r>
+            <a:r>
+              <a:rPr lang="pt-BR" b="1" i="1" dirty="0"/>
+              <a:t>web</a:t>
+            </a:r>
+            <a:r>
+              <a:rPr lang="pt-BR" b="1" dirty="0"/>
+              <a:t>.</a:t>
+            </a:r>
+            <a:r>
+              <a:rPr lang="pt-BR" dirty="0"/>
+              <a:t> São aplicativos que são executados via Internet;</a:t>
+            </a:r>
+          </a:p>
+          <a:p>
+            <a:pPr marL="0" indent="0">
+              <a:buNone/>
+            </a:pPr>
+            <a:endParaRPr lang="pt-BR" dirty="0"/>
+          </a:p>
+          <a:p>
             <a:pPr algn="just">
               <a:buFont typeface="Wingdings" pitchFamily="2" charset="2"/>
               <a:buChar char="q"/>
@@ -11449,59 +11295,20 @@
             </a:r>
             <a:r>
               <a:rPr lang="pt-BR" b="1" dirty="0"/>
-              <a:t> Legado</a:t>
+              <a:t> de inteligência artificial.</a:t>
             </a:r>
             <a:r>
               <a:rPr lang="pt-BR" dirty="0"/>
-              <a:t>. O nome de </a:t>
-            </a:r>
-            <a:r>
-              <a:rPr lang="pt-BR" i="1" dirty="0"/>
-              <a:t>software</a:t>
-            </a:r>
-            <a:r>
-              <a:rPr lang="pt-BR" dirty="0"/>
-              <a:t> legado é dado quando refere se num programa de computador que foi desenvolvido por há muito tempo. A preocupação do engenheiro de </a:t>
-            </a:r>
-            <a:r>
-              <a:rPr lang="pt-BR" i="1" dirty="0"/>
-              <a:t>software</a:t>
-            </a:r>
-            <a:r>
-              <a:rPr lang="pt-BR" dirty="0"/>
-              <a:t> com os </a:t>
-            </a:r>
-            <a:r>
-              <a:rPr lang="pt-BR" i="1" dirty="0"/>
-              <a:t>softwares</a:t>
-            </a:r>
-            <a:r>
-              <a:rPr lang="pt-BR" dirty="0"/>
-              <a:t> legados esta na baixa qualidade do </a:t>
-            </a:r>
-            <a:r>
-              <a:rPr lang="pt-BR" i="1" dirty="0"/>
-              <a:t>software</a:t>
-            </a:r>
-            <a:r>
-              <a:rPr lang="pt-BR" dirty="0"/>
-              <a:t>. Muitas vezes não existem documentações e se existem são pobres de detalhes, os casos de teste são pobres quando tem e sem um controle de mudanças. E muitas vezes não mexem no </a:t>
-            </a:r>
-            <a:r>
-              <a:rPr lang="pt-BR" i="1" dirty="0"/>
-              <a:t>software</a:t>
-            </a:r>
-            <a:r>
-              <a:rPr lang="pt-BR" dirty="0"/>
-              <a:t> legado quando eles atentem as necessidades do cliente (PRESSMAN, 2006).</a:t>
-            </a:r>
+              <a:t> São soluções tecnológicas que simulam a capacidade humana de aprendizado, raciocínio e tomada de decisões.</a:t>
+            </a:r>
+            <a:endParaRPr lang="en-US" dirty="0"/>
           </a:p>
         </p:txBody>
       </p:sp>
     </p:spTree>
     <p:extLst>
       <p:ext uri="{BB962C8B-B14F-4D97-AF65-F5344CB8AC3E}">
-        <p14:creationId xmlns:p14="http://schemas.microsoft.com/office/powerpoint/2010/main" val="1478780828"/>
+        <p14:creationId xmlns:p14="http://schemas.microsoft.com/office/powerpoint/2010/main" val="1285958173"/>
       </p:ext>
     </p:extLst>
   </p:cSld>

</xml_diff>

<commit_message>
Ajuste ppt aulas eng software
</commit_message>
<xml_diff>
--- a/01 Classes/Aulas 01 e 02 Conceitos Eng. Soft e Métodos Ágeis.pptx
+++ b/01 Classes/Aulas 01 e 02 Conceitos Eng. Soft e Métodos Ágeis.pptx
@@ -1425,11 +1425,6 @@
         </p:txBody>
       </p:sp>
     </p:spTree>
-    <p:extLst>
-      <p:ext uri="{BB962C8B-B14F-4D97-AF65-F5344CB8AC3E}">
-        <p14:creationId xmlns:p14="http://schemas.microsoft.com/office/powerpoint/2010/main" val="1453187728"/>
-      </p:ext>
-    </p:extLst>
   </p:cSld>
   <p:clrMapOvr>
     <a:masterClrMapping/>
@@ -6402,7 +6397,15 @@
             </a:pPr>
             <a:r>
               <a:rPr lang="pt-BR" dirty="0"/>
-              <a:t>	Além de agilidade, os métodos ágeis são:</a:t>
+              <a:t>	Além de agilidade, os </a:t>
+            </a:r>
+            <a:r>
+              <a:rPr lang="pt-BR" b="1" dirty="0"/>
+              <a:t>métodos ágeis </a:t>
+            </a:r>
+            <a:r>
+              <a:rPr lang="pt-BR" dirty="0"/>
+              <a:t>são:</a:t>
             </a:r>
           </a:p>
           <a:p>
@@ -7257,28 +7260,32 @@
               <a:t>	</a:t>
             </a:r>
             <a:r>
-              <a:rPr lang="pt-BR" sz="2400" dirty="0" err="1"/>
+              <a:rPr lang="pt-BR" sz="2400" b="1" dirty="0" err="1"/>
               <a:t>Feature</a:t>
             </a:r>
             <a:r>
+              <a:rPr lang="pt-BR" sz="2400" b="1" dirty="0"/>
+              <a:t> </a:t>
+            </a:r>
+            <a:r>
+              <a:rPr lang="pt-BR" sz="2400" b="1" dirty="0" err="1"/>
+              <a:t>Driven</a:t>
+            </a:r>
+            <a:r>
+              <a:rPr lang="pt-BR" sz="2400" b="1" dirty="0"/>
+              <a:t> </a:t>
+            </a:r>
+            <a:r>
+              <a:rPr lang="pt-BR" sz="2400" b="1" dirty="0" err="1"/>
+              <a:t>Development</a:t>
+            </a:r>
+            <a:r>
+              <a:rPr lang="pt-BR" sz="2400" b="1" dirty="0"/>
+              <a:t> (FDD)</a:t>
+            </a:r>
+            <a:r>
               <a:rPr lang="pt-BR" sz="2400" dirty="0"/>
-              <a:t> </a:t>
-            </a:r>
-            <a:r>
-              <a:rPr lang="pt-BR" sz="2400" dirty="0" err="1"/>
-              <a:t>Driven</a:t>
-            </a:r>
-            <a:r>
-              <a:rPr lang="pt-BR" sz="2400" dirty="0"/>
-              <a:t> </a:t>
-            </a:r>
-            <a:r>
-              <a:rPr lang="pt-BR" sz="2400" dirty="0" err="1"/>
-              <a:t>Development</a:t>
-            </a:r>
-            <a:r>
-              <a:rPr lang="pt-BR" sz="2400" dirty="0"/>
-              <a:t> (FDD): A sua premissa básica tem o foco em funcionalidades, o que permite à equipe do projeto realizar um planejamento incremental, isto é, por fases.</a:t>
+              <a:t>: A sua premissa básica tem o foco em funcionalidades, o que permite à equipe do projeto realizar um planejamento incremental, isto é, por fases.</a:t>
             </a:r>
           </a:p>
           <a:p>
@@ -7429,7 +7436,15 @@
             </a:pPr>
             <a:r>
               <a:rPr lang="pt-BR" sz="2400" dirty="0"/>
-              <a:t>Assim como todos os demais métodos ágeis, o FDD também apresenta melhores práticas que visam criar o ambiente ideal para o desenvolvimento de projetos. São elas:</a:t>
+              <a:t>Assim como todos os demais métodos ágeis, o </a:t>
+            </a:r>
+            <a:r>
+              <a:rPr lang="pt-BR" sz="2400" b="1" dirty="0"/>
+              <a:t>FDD</a:t>
+            </a:r>
+            <a:r>
+              <a:rPr lang="pt-BR" sz="2400" dirty="0"/>
+              <a:t> também apresenta melhores práticas que visam criar o ambiente ideal para o desenvolvimento de projetos. São elas:</a:t>
             </a:r>
           </a:p>
           <a:p>
@@ -7606,7 +7621,7 @@
         <p:spPr>
           <a:xfrm>
             <a:off x="457200" y="1600200"/>
-            <a:ext cx="8572500" cy="4525963"/>
+            <a:ext cx="8572500" cy="4834467"/>
           </a:xfrm>
         </p:spPr>
         <p:txBody>
@@ -7623,20 +7638,40 @@
               <a:t>	O </a:t>
             </a:r>
             <a:r>
-              <a:rPr lang="pt-BR" sz="2400" dirty="0" err="1"/>
+              <a:rPr lang="pt-BR" sz="2400" b="1" dirty="0" err="1"/>
               <a:t>eXtreme</a:t>
             </a:r>
             <a:r>
+              <a:rPr lang="pt-BR" sz="2400" b="1" dirty="0"/>
+              <a:t> </a:t>
+            </a:r>
+            <a:r>
+              <a:rPr lang="pt-BR" sz="2400" b="1" dirty="0" err="1"/>
+              <a:t>Programming</a:t>
+            </a:r>
+            <a:r>
               <a:rPr lang="pt-BR" sz="2400" dirty="0"/>
-              <a:t> </a:t>
-            </a:r>
-            <a:r>
-              <a:rPr lang="pt-BR" sz="2400" dirty="0" err="1"/>
-              <a:t>Programming</a:t>
+              <a:t>, chamado de XP, é um método ágil com foco no desenvolvimento de softwares com base em </a:t>
+            </a:r>
+            <a:r>
+              <a:rPr lang="pt-BR" sz="2400" b="1" dirty="0"/>
+              <a:t>três pilares</a:t>
             </a:r>
             <a:r>
               <a:rPr lang="pt-BR" sz="2400" dirty="0"/>
-              <a:t>, chamado de XP, é um método ágil com foco no desenvolvimento de softwares com base em três pilares: agilidade no desenvolvimento da solução, economia de recursos e qualidade do produto final.</a:t>
+              <a:t>: </a:t>
+            </a:r>
+            <a:r>
+              <a:rPr lang="pt-BR" sz="2400" b="1" dirty="0">
+                <a:solidFill>
+                  <a:srgbClr val="FF0000"/>
+                </a:solidFill>
+              </a:rPr>
+              <a:t>agilidade no desenvolvimento da solução, economia de recursos e qualidade do produto final</a:t>
+            </a:r>
+            <a:r>
+              <a:rPr lang="pt-BR" sz="2400" dirty="0"/>
+              <a:t>.</a:t>
             </a:r>
           </a:p>
           <a:p>
@@ -7646,14 +7681,50 @@
             <a:endParaRPr lang="pt-BR" sz="2400" dirty="0"/>
           </a:p>
           <a:p>
-            <a:pPr marL="0" indent="0">
+            <a:pPr marL="0" indent="0" algn="just">
               <a:buNone/>
             </a:pPr>
             <a:r>
               <a:rPr lang="pt-BR" sz="2400" dirty="0"/>
               <a:t>	Para chegar à excelência nos serviços prestados, uma equipe XP deve se basear em valores, isto é, um contrato de atitudes e comportamentos que levam ao sucesso.</a:t>
             </a:r>
-            <a:endParaRPr lang="pt-BR" sz="2400" b="1" u="sng" dirty="0"/>
+          </a:p>
+          <a:p>
+            <a:pPr marL="0" indent="0" algn="just">
+              <a:buNone/>
+            </a:pPr>
+            <a:endParaRPr lang="pt-BR" sz="2400" dirty="0"/>
+          </a:p>
+          <a:p>
+            <a:pPr marL="0" indent="0" algn="just">
+              <a:buNone/>
+            </a:pPr>
+            <a:r>
+              <a:rPr lang="pt-BR" sz="2400" dirty="0"/>
+              <a:t>	Boas práticas, tais como: testar o código, revisar, </a:t>
+            </a:r>
+            <a:r>
+              <a:rPr lang="pt-BR" sz="2400" dirty="0" err="1"/>
+              <a:t>refatorar</a:t>
+            </a:r>
+            <a:r>
+              <a:rPr lang="pt-BR" sz="2400" dirty="0"/>
+              <a:t>, teste de integração contínua, simplicidade no código, iterações curtas, </a:t>
+            </a:r>
+            <a:r>
+              <a:rPr lang="pt-BR" sz="2400" dirty="0" err="1"/>
+              <a:t>etc</a:t>
+            </a:r>
+            <a:r>
+              <a:rPr lang="pt-BR" sz="2400" dirty="0"/>
+              <a:t>  </a:t>
+            </a:r>
+          </a:p>
+          <a:p>
+            <a:pPr marL="0" indent="0" algn="just">
+              <a:buNone/>
+            </a:pPr>
+            <a:endParaRPr lang="pt-BR" sz="2400" dirty="0"/>
           </a:p>
         </p:txBody>
       </p:sp>
@@ -7782,14 +7853,44 @@
             </a:pPr>
             <a:r>
               <a:rPr lang="pt-BR" sz="2400" dirty="0"/>
-              <a:t>	Esses comportamentos e atitudes norteiam as ações da equipe XP em cada atividade a ser desempenhada, garantindo a integração e a sinergia necessárias para o bom desempenho. No caso, esses valores são:</a:t>
+              <a:t>	Esses comportamentos e atitudes norteiam as ações da equipe XP em cada atividade a ser desempenhada, garantindo a integração e a sinergia necessárias para o bom desempenho. No caso, esses </a:t>
+            </a:r>
+            <a:r>
+              <a:rPr lang="pt-BR" sz="2400" b="1" dirty="0"/>
+              <a:t>valores/</a:t>
+            </a:r>
+            <a:r>
+              <a:rPr lang="pt-BR" sz="2400" b="1" dirty="0" err="1"/>
+              <a:t>principios</a:t>
+            </a:r>
+            <a:r>
+              <a:rPr lang="pt-BR" sz="2400" dirty="0"/>
+              <a:t> são:</a:t>
             </a:r>
           </a:p>
           <a:p>
             <a:pPr marL="0" indent="0" algn="just">
               <a:buNone/>
             </a:pPr>
-            <a:endParaRPr lang="pt-BR" sz="2400" dirty="0"/>
+            <a:endParaRPr lang="pt-BR" sz="2400" b="1" u="sng" dirty="0">
+              <a:solidFill>
+                <a:srgbClr val="FF0000"/>
+              </a:solidFill>
+            </a:endParaRPr>
+          </a:p>
+          <a:p>
+            <a:pPr marL="0" indent="0" algn="just">
+              <a:buNone/>
+            </a:pPr>
+            <a:r>
+              <a:rPr lang="pt-BR" sz="1800" b="1" u="sng" dirty="0">
+                <a:solidFill>
+                  <a:srgbClr val="FF0000"/>
+                </a:solidFill>
+              </a:rPr>
+              <a:t>Valores</a:t>
+            </a:r>
+            <a:endParaRPr lang="pt-BR" sz="1800" dirty="0"/>
           </a:p>
           <a:p>
             <a:pPr algn="just"/>
@@ -7837,6 +7938,110 @@
               <a:buNone/>
             </a:pPr>
             <a:endParaRPr lang="pt-BR" sz="2400" b="1" u="sng" dirty="0"/>
+          </a:p>
+        </p:txBody>
+      </p:sp>
+      <p:sp>
+        <p:nvSpPr>
+          <p:cNvPr id="3" name="CaixaDeTexto 2">
+            <a:extLst>
+              <a:ext uri="{FF2B5EF4-FFF2-40B4-BE49-F238E27FC236}">
+                <a16:creationId xmlns:a16="http://schemas.microsoft.com/office/drawing/2014/main" id="{68F3C904-6AAD-84DB-7D45-6DA2EC1B8F2D}"/>
+              </a:ext>
+            </a:extLst>
+          </p:cNvPr>
+          <p:cNvSpPr txBox="1"/>
+          <p:nvPr/>
+        </p:nvSpPr>
+        <p:spPr>
+          <a:xfrm>
+            <a:off x="3005667" y="3649133"/>
+            <a:ext cx="5681133" cy="1477328"/>
+          </a:xfrm>
+          <a:prstGeom prst="rect">
+            <a:avLst/>
+          </a:prstGeom>
+          <a:noFill/>
+          <a:ln w="12700" cap="flat">
+            <a:noFill/>
+            <a:miter lim="400000"/>
+          </a:ln>
+          <a:effectLst/>
+          <a:sp3d/>
+        </p:spPr>
+        <p:style>
+          <a:lnRef idx="0">
+            <a:scrgbClr r="0" g="0" b="0"/>
+          </a:lnRef>
+          <a:fillRef idx="0">
+            <a:scrgbClr r="0" g="0" b="0"/>
+          </a:fillRef>
+          <a:effectRef idx="0">
+            <a:scrgbClr r="0" g="0" b="0"/>
+          </a:effectRef>
+          <a:fontRef idx="none"/>
+        </p:style>
+        <p:txBody>
+          <a:bodyPr wrap="square">
+            <a:spAutoFit/>
+          </a:bodyPr>
+          <a:lstStyle/>
+          <a:p>
+            <a:pPr marL="0" indent="0" algn="just">
+              <a:buNone/>
+            </a:pPr>
+            <a:r>
+              <a:rPr lang="pt-BR" sz="1800" dirty="0"/>
+              <a:t>		</a:t>
+            </a:r>
+            <a:r>
+              <a:rPr lang="pt-BR" sz="1800" b="1" u="sng" dirty="0">
+                <a:solidFill>
+                  <a:srgbClr val="FF0000"/>
+                </a:solidFill>
+              </a:rPr>
+              <a:t>Princípios</a:t>
+            </a:r>
+          </a:p>
+          <a:p>
+            <a:pPr marL="0" indent="0" algn="just">
+              <a:buNone/>
+            </a:pPr>
+            <a:endParaRPr lang="pt-BR" sz="1800" b="1" u="sng" dirty="0">
+              <a:solidFill>
+                <a:srgbClr val="FF0000"/>
+              </a:solidFill>
+            </a:endParaRPr>
+          </a:p>
+          <a:p>
+            <a:pPr algn="just">
+              <a:buFont typeface="Wingdings" panose="05000000000000000000" pitchFamily="2" charset="2"/>
+              <a:buChar char="ü"/>
+            </a:pPr>
+            <a:r>
+              <a:rPr lang="pt-BR" sz="1800" dirty="0"/>
+              <a:t>	Feedback rápido / Presumir Simplicidade / </a:t>
+            </a:r>
+          </a:p>
+          <a:p>
+            <a:pPr algn="just">
+              <a:buFont typeface="Wingdings" panose="05000000000000000000" pitchFamily="2" charset="2"/>
+              <a:buChar char="ü"/>
+            </a:pPr>
+            <a:r>
+              <a:rPr lang="pt-BR" sz="1800" dirty="0"/>
+              <a:t>	Mudanças Incrementais / Abraçar mudanças /</a:t>
+            </a:r>
+          </a:p>
+          <a:p>
+            <a:pPr algn="just">
+              <a:buFont typeface="Wingdings" panose="05000000000000000000" pitchFamily="2" charset="2"/>
+              <a:buChar char="ü"/>
+            </a:pPr>
+            <a:r>
+              <a:rPr lang="pt-BR" sz="1800" dirty="0"/>
+              <a:t>	Trabalho de alta qualidade</a:t>
+            </a:r>
           </a:p>
         </p:txBody>
       </p:sp>
@@ -7985,28 +8190,6 @@
             <a:pPr algn="just"/>
             <a:r>
               <a:rPr lang="pt-BR" sz="2400" dirty="0"/>
-              <a:t>uso de metáforas;</a:t>
-            </a:r>
-          </a:p>
-          <a:p>
-            <a:pPr algn="just"/>
-            <a:r>
-              <a:rPr lang="pt-BR" sz="2400" dirty="0"/>
-              <a:t>reuniões de planejamento (</a:t>
-            </a:r>
-            <a:r>
-              <a:rPr lang="pt-BR" sz="2400" dirty="0" err="1"/>
-              <a:t>planning</a:t>
-            </a:r>
-            <a:r>
-              <a:rPr lang="pt-BR" sz="2400" dirty="0"/>
-              <a:t> game);</a:t>
-            </a:r>
-          </a:p>
-          <a:p>
-            <a:pPr algn="just"/>
-            <a:r>
-              <a:rPr lang="pt-BR" sz="2400" dirty="0"/>
               <a:t>reuniões diárias, de 15 minutos, para alinhamento (stand </a:t>
             </a:r>
             <a:r>
@@ -8016,6 +8199,13 @@
             <a:r>
               <a:rPr lang="pt-BR" sz="2400" dirty="0"/>
               <a:t> meeting);</a:t>
+            </a:r>
+          </a:p>
+          <a:p>
+            <a:pPr algn="just"/>
+            <a:r>
+              <a:rPr lang="pt-BR" sz="2400" dirty="0"/>
+              <a:t>mudanças incrementais e iterativas;</a:t>
             </a:r>
           </a:p>
         </p:txBody>
@@ -8053,13 +8243,7 @@
       </p:grpSpPr>
       <p:sp>
         <p:nvSpPr>
-          <p:cNvPr id="6" name="Title 1">
-            <a:extLst>
-              <a:ext uri="{FF2B5EF4-FFF2-40B4-BE49-F238E27FC236}">
-                <a16:creationId xmlns:a16="http://schemas.microsoft.com/office/drawing/2014/main" id="{F291B388-1CB9-4ABA-B745-E07952DE201C}"/>
-              </a:ext>
-            </a:extLst>
-          </p:cNvPr>
+          <p:cNvPr id="6" name="Title 1"/>
           <p:cNvSpPr>
             <a:spLocks noGrp="1"/>
           </p:cNvSpPr>
@@ -8107,20 +8291,30 @@
                   <a:srgbClr val="0070C0"/>
                 </a:solidFill>
               </a:rPr>
-              <a:t> - XP</a:t>
+              <a:t> - XP (</a:t>
+            </a:r>
+            <a:r>
+              <a:rPr lang="en-US" b="1" dirty="0" err="1">
+                <a:solidFill>
+                  <a:srgbClr val="0070C0"/>
+                </a:solidFill>
+              </a:rPr>
+              <a:t>Continuação</a:t>
+            </a:r>
+            <a:r>
+              <a:rPr lang="en-US" b="1" dirty="0">
+                <a:solidFill>
+                  <a:srgbClr val="0070C0"/>
+                </a:solidFill>
+              </a:rPr>
+              <a:t>)</a:t>
             </a:r>
           </a:p>
         </p:txBody>
       </p:sp>
       <p:sp>
         <p:nvSpPr>
-          <p:cNvPr id="8" name="Text Placeholder 2">
-            <a:extLst>
-              <a:ext uri="{FF2B5EF4-FFF2-40B4-BE49-F238E27FC236}">
-                <a16:creationId xmlns:a16="http://schemas.microsoft.com/office/drawing/2014/main" id="{AC373644-6BFC-4524-A158-0B6C03B47B2E}"/>
-              </a:ext>
-            </a:extLst>
-          </p:cNvPr>
+          <p:cNvPr id="8" name="Text Placeholder 2"/>
           <p:cNvSpPr>
             <a:spLocks noGrp="1"/>
           </p:cNvSpPr>
@@ -8131,7 +8325,7 @@
         <p:spPr>
           <a:xfrm>
             <a:off x="457200" y="1600200"/>
-            <a:ext cx="8572500" cy="4525963"/>
+            <a:ext cx="8572500" cy="4983162"/>
           </a:xfrm>
         </p:spPr>
         <p:txBody>
@@ -8140,85 +8334,306 @@
           </a:bodyPr>
           <a:lstStyle/>
           <a:p>
-            <a:pPr marL="0" indent="0">
+            <a:pPr marL="0" indent="0" algn="just">
               <a:buNone/>
             </a:pPr>
             <a:r>
-              <a:rPr lang="pt-BR" sz="2400" b="1" dirty="0"/>
-              <a:t>	... melhores práticas de trabalho, São elas:</a:t>
-            </a:r>
-          </a:p>
-          <a:p>
-            <a:pPr marL="0" indent="0">
+              <a:rPr lang="pt-BR" sz="2400" dirty="0"/>
+              <a:t>	</a:t>
+            </a:r>
+            <a:r>
+              <a:rPr lang="pt-BR" b="1" dirty="0">
+                <a:solidFill>
+                  <a:srgbClr val="FF0000"/>
+                </a:solidFill>
+              </a:rPr>
+              <a:t>Práticas</a:t>
+            </a:r>
+          </a:p>
+          <a:p>
+            <a:pPr algn="just">
+              <a:buFont typeface="Wingdings" panose="05000000000000000000" pitchFamily="2" charset="2"/>
+              <a:buChar char="ü"/>
+            </a:pPr>
+            <a:r>
+              <a:rPr lang="pt-BR" sz="2000" dirty="0"/>
+              <a:t>Jogo de Planejamento, reuniões de planejamento </a:t>
+            </a:r>
+            <a:r>
+              <a:rPr lang="pt-BR" sz="2000" b="1" dirty="0"/>
+              <a:t>(Planning Game)</a:t>
+            </a:r>
+          </a:p>
+          <a:p>
+            <a:pPr algn="just">
+              <a:buFont typeface="Wingdings" panose="05000000000000000000" pitchFamily="2" charset="2"/>
+              <a:buChar char="ü"/>
+            </a:pPr>
+            <a:r>
+              <a:rPr lang="pt-BR" sz="2000" dirty="0"/>
+              <a:t>Fases pequenas, entregas frequentes ao cliente </a:t>
+            </a:r>
+            <a:r>
+              <a:rPr lang="pt-BR" sz="2000" b="1" dirty="0"/>
+              <a:t>(</a:t>
+            </a:r>
+            <a:r>
+              <a:rPr lang="pt-BR" sz="2000" b="1" dirty="0" err="1"/>
+              <a:t>Small</a:t>
+            </a:r>
+            <a:r>
+              <a:rPr lang="pt-BR" sz="2000" b="1" dirty="0"/>
+              <a:t> Releases)</a:t>
+            </a:r>
+          </a:p>
+          <a:p>
+            <a:pPr algn="just">
+              <a:buFont typeface="Wingdings" panose="05000000000000000000" pitchFamily="2" charset="2"/>
+              <a:buChar char="ü"/>
+            </a:pPr>
+            <a:r>
+              <a:rPr lang="pt-BR" sz="2000" dirty="0"/>
+              <a:t>Metáfora </a:t>
+            </a:r>
+            <a:r>
+              <a:rPr lang="pt-BR" sz="2000" b="1" dirty="0"/>
+              <a:t>(</a:t>
+            </a:r>
+            <a:r>
+              <a:rPr lang="pt-BR" sz="2000" b="1" dirty="0" err="1"/>
+              <a:t>Metaphor</a:t>
+            </a:r>
+            <a:r>
+              <a:rPr lang="pt-BR" sz="2000" b="1" dirty="0"/>
+              <a:t>)</a:t>
+            </a:r>
+          </a:p>
+          <a:p>
+            <a:pPr algn="just">
+              <a:buFont typeface="Wingdings" panose="05000000000000000000" pitchFamily="2" charset="2"/>
+              <a:buChar char="ü"/>
+            </a:pPr>
+            <a:r>
+              <a:rPr lang="pt-BR" sz="2000" dirty="0"/>
+              <a:t>Design Simples e funcional </a:t>
+            </a:r>
+            <a:r>
+              <a:rPr lang="pt-BR" sz="2000" b="1" dirty="0"/>
+              <a:t>(</a:t>
+            </a:r>
+            <a:r>
+              <a:rPr lang="pt-BR" sz="2000" b="1" dirty="0" err="1"/>
+              <a:t>Simple</a:t>
+            </a:r>
+            <a:r>
+              <a:rPr lang="pt-BR" sz="2000" b="1" dirty="0"/>
+              <a:t> Design)</a:t>
+            </a:r>
+          </a:p>
+          <a:p>
+            <a:pPr algn="just">
+              <a:buFont typeface="Wingdings" panose="05000000000000000000" pitchFamily="2" charset="2"/>
+              <a:buChar char="ü"/>
+            </a:pPr>
+            <a:r>
+              <a:rPr lang="pt-BR" sz="2000" dirty="0"/>
+              <a:t>Testes de Aceitação </a:t>
+            </a:r>
+            <a:r>
+              <a:rPr lang="pt-BR" sz="2000" b="1" dirty="0"/>
+              <a:t>(</a:t>
+            </a:r>
+            <a:r>
+              <a:rPr lang="pt-BR" sz="2000" b="1" dirty="0" err="1"/>
+              <a:t>Customer</a:t>
+            </a:r>
+            <a:r>
+              <a:rPr lang="pt-BR" sz="2000" b="1" dirty="0"/>
+              <a:t> </a:t>
+            </a:r>
+            <a:r>
+              <a:rPr lang="pt-BR" sz="2000" b="1" dirty="0" err="1"/>
+              <a:t>Tests</a:t>
+            </a:r>
+            <a:r>
+              <a:rPr lang="pt-BR" sz="2000" b="1" dirty="0"/>
+              <a:t>)</a:t>
+            </a:r>
+          </a:p>
+          <a:p>
+            <a:pPr algn="just">
+              <a:buFont typeface="Wingdings" panose="05000000000000000000" pitchFamily="2" charset="2"/>
+              <a:buChar char="ü"/>
+            </a:pPr>
+            <a:r>
+              <a:rPr lang="pt-BR" sz="2000" dirty="0"/>
+              <a:t>Semana de 40 horas </a:t>
+            </a:r>
+            <a:r>
+              <a:rPr lang="pt-BR" sz="2000" b="1" dirty="0"/>
+              <a:t>(</a:t>
+            </a:r>
+            <a:r>
+              <a:rPr lang="pt-BR" sz="2000" b="1" dirty="0" err="1"/>
+              <a:t>Sustainable</a:t>
+            </a:r>
+            <a:r>
+              <a:rPr lang="pt-BR" sz="2000" b="1" dirty="0"/>
+              <a:t> Pace)</a:t>
+            </a:r>
+          </a:p>
+          <a:p>
+            <a:pPr algn="just">
+              <a:buFont typeface="Wingdings" panose="05000000000000000000" pitchFamily="2" charset="2"/>
+              <a:buChar char="ü"/>
+            </a:pPr>
+            <a:r>
+              <a:rPr lang="pt-BR" sz="2000" dirty="0"/>
+              <a:t>Propriedade Coletiva </a:t>
+            </a:r>
+            <a:r>
+              <a:rPr lang="pt-BR" sz="2000" b="1" dirty="0"/>
+              <a:t>(</a:t>
+            </a:r>
+            <a:r>
+              <a:rPr lang="pt-BR" sz="2000" b="1" dirty="0" err="1"/>
+              <a:t>Collective</a:t>
+            </a:r>
+            <a:r>
+              <a:rPr lang="pt-BR" sz="2000" b="1" dirty="0"/>
+              <a:t> </a:t>
+            </a:r>
+            <a:r>
+              <a:rPr lang="pt-BR" sz="2000" b="1" dirty="0" err="1"/>
+              <a:t>Ownership</a:t>
+            </a:r>
+            <a:r>
+              <a:rPr lang="pt-BR" sz="2000" b="1" dirty="0"/>
+              <a:t>)</a:t>
+            </a:r>
+          </a:p>
+          <a:p>
+            <a:pPr algn="just">
+              <a:buFont typeface="Wingdings" panose="05000000000000000000" pitchFamily="2" charset="2"/>
+              <a:buChar char="ü"/>
+            </a:pPr>
+            <a:r>
+              <a:rPr lang="pt-BR" sz="2000" dirty="0"/>
+              <a:t>Programação Pareada </a:t>
+            </a:r>
+            <a:r>
+              <a:rPr lang="pt-BR" sz="2000" b="1" dirty="0"/>
+              <a:t>(</a:t>
+            </a:r>
+            <a:r>
+              <a:rPr lang="pt-BR" sz="2000" b="1" dirty="0" err="1"/>
+              <a:t>Pair</a:t>
+            </a:r>
+            <a:r>
+              <a:rPr lang="pt-BR" sz="2000" b="1" dirty="0"/>
+              <a:t> </a:t>
+            </a:r>
+            <a:r>
+              <a:rPr lang="pt-BR" sz="2000" b="1" dirty="0" err="1"/>
+              <a:t>Programming</a:t>
+            </a:r>
+            <a:r>
+              <a:rPr lang="pt-BR" sz="2000" b="1" dirty="0"/>
+              <a:t>)</a:t>
+            </a:r>
+          </a:p>
+          <a:p>
+            <a:pPr algn="just">
+              <a:buFont typeface="Wingdings" panose="05000000000000000000" pitchFamily="2" charset="2"/>
+              <a:buChar char="ü"/>
+            </a:pPr>
+            <a:r>
+              <a:rPr lang="pt-BR" sz="2000" dirty="0"/>
+              <a:t>Desenvolvimento Orientado a Testes </a:t>
+            </a:r>
+            <a:r>
+              <a:rPr lang="pt-BR" sz="2000" b="1" dirty="0"/>
+              <a:t>(Test </a:t>
+            </a:r>
+            <a:r>
+              <a:rPr lang="pt-BR" sz="2000" b="1" dirty="0" err="1"/>
+              <a:t>Driven</a:t>
+            </a:r>
+            <a:r>
+              <a:rPr lang="pt-BR" sz="2000" b="1" dirty="0"/>
+              <a:t> </a:t>
+            </a:r>
+            <a:r>
+              <a:rPr lang="pt-BR" sz="2000" b="1" dirty="0" err="1"/>
+              <a:t>Development</a:t>
+            </a:r>
+            <a:r>
+              <a:rPr lang="pt-BR" sz="2000" b="1" dirty="0"/>
+              <a:t> - TDD)</a:t>
+            </a:r>
+            <a:endParaRPr lang="pt-BR" sz="2400" b="1" dirty="0"/>
+          </a:p>
+          <a:p>
+            <a:pPr algn="just">
+              <a:buFont typeface="Wingdings" panose="05000000000000000000" pitchFamily="2" charset="2"/>
+              <a:buChar char="ü"/>
+            </a:pPr>
+            <a:r>
+              <a:rPr lang="pt-BR" sz="2000" dirty="0"/>
+              <a:t>Refatoração, melhoria continua </a:t>
+            </a:r>
+            <a:r>
+              <a:rPr lang="pt-BR" sz="2000" b="1" dirty="0"/>
+              <a:t>(</a:t>
+            </a:r>
+            <a:r>
+              <a:rPr lang="pt-BR" sz="2000" b="1" dirty="0" err="1"/>
+              <a:t>Refactoring</a:t>
+            </a:r>
+            <a:r>
+              <a:rPr lang="pt-BR" sz="2000" b="1" dirty="0"/>
+              <a:t>)</a:t>
+            </a:r>
+          </a:p>
+          <a:p>
+            <a:pPr algn="just">
+              <a:buFont typeface="Wingdings" panose="05000000000000000000" pitchFamily="2" charset="2"/>
+              <a:buChar char="ü"/>
+            </a:pPr>
+            <a:r>
+              <a:rPr lang="pt-BR" sz="2000" dirty="0"/>
+              <a:t>Integração Contínua dos módulos </a:t>
+            </a:r>
+            <a:r>
+              <a:rPr lang="pt-BR" sz="2000" b="1" dirty="0"/>
+              <a:t>(</a:t>
+            </a:r>
+            <a:r>
+              <a:rPr lang="pt-BR" sz="2000" b="1" dirty="0" err="1"/>
+              <a:t>Continuous</a:t>
+            </a:r>
+            <a:r>
+              <a:rPr lang="pt-BR" sz="2000" b="1" dirty="0"/>
+              <a:t> </a:t>
+            </a:r>
+            <a:r>
+              <a:rPr lang="pt-BR" sz="2000" b="1" dirty="0" err="1"/>
+              <a:t>Integration</a:t>
+            </a:r>
+            <a:r>
+              <a:rPr lang="pt-BR" sz="2000" b="1" dirty="0"/>
+              <a:t>)</a:t>
+            </a:r>
+          </a:p>
+          <a:p>
+            <a:pPr marL="0" indent="0" algn="just">
               <a:buNone/>
             </a:pPr>
             <a:endParaRPr lang="pt-BR" sz="2400" dirty="0"/>
-          </a:p>
-          <a:p>
-            <a:r>
-              <a:rPr lang="pt-BR" sz="2400" dirty="0"/>
-              <a:t>integração contínua dos módulos desenvolvidos;</a:t>
-            </a:r>
-          </a:p>
-          <a:p>
-            <a:r>
-              <a:rPr lang="pt-BR" sz="2400" dirty="0"/>
-              <a:t>mudanças incrementais;</a:t>
-            </a:r>
-          </a:p>
-          <a:p>
-            <a:r>
-              <a:rPr lang="pt-BR" sz="2400" dirty="0"/>
-              <a:t>entregas frequentes ao cliente (</a:t>
-            </a:r>
-            <a:r>
-              <a:rPr lang="pt-BR" sz="2400" dirty="0" err="1"/>
-              <a:t>small</a:t>
-            </a:r>
-            <a:r>
-              <a:rPr lang="pt-BR" sz="2400" dirty="0"/>
-              <a:t> releases);</a:t>
-            </a:r>
-          </a:p>
-          <a:p>
-            <a:r>
-              <a:rPr lang="pt-BR" sz="2400" dirty="0"/>
-              <a:t>design simples e funcional;</a:t>
-            </a:r>
-          </a:p>
-          <a:p>
-            <a:r>
-              <a:rPr lang="pt-BR" sz="2400" dirty="0"/>
-              <a:t>testes de aceitação;</a:t>
-            </a:r>
-          </a:p>
-          <a:p>
-            <a:r>
-              <a:rPr lang="pt-BR" sz="2400" dirty="0" err="1"/>
-              <a:t>refatoração</a:t>
-            </a:r>
-            <a:r>
-              <a:rPr lang="pt-BR" sz="2400" dirty="0"/>
-              <a:t> (</a:t>
-            </a:r>
-            <a:r>
-              <a:rPr lang="pt-BR" sz="2400" dirty="0" err="1"/>
-              <a:t>refactoring</a:t>
-            </a:r>
-            <a:r>
-              <a:rPr lang="pt-BR" sz="2400" dirty="0"/>
-              <a:t>) ou melhoria contínua.</a:t>
-            </a:r>
-            <a:endParaRPr lang="pt-BR" sz="2400" b="1" u="sng" dirty="0"/>
           </a:p>
         </p:txBody>
       </p:sp>
     </p:spTree>
-    <p:extLst>
-      <p:ext uri="{BB962C8B-B14F-4D97-AF65-F5344CB8AC3E}">
-        <p14:creationId xmlns:p14="http://schemas.microsoft.com/office/powerpoint/2010/main" val="447957467"/>
-      </p:ext>
-    </p:extLst>
   </p:cSld>
   <p:clrMapOvr>
     <a:masterClrMapping/>
@@ -8342,7 +8757,15 @@
             </a:r>
             <a:r>
               <a:rPr lang="pt-BR" sz="2400" dirty="0"/>
-              <a:t>O MSF é um dos métodos ágeis mais usados por se destinar ao desenvolvimento de soluções tecnológicas por equipes reduzidas, com foco na diminuição de riscos para o negócio e no aumento da qualidade do produto final.</a:t>
+              <a:t>O </a:t>
+            </a:r>
+            <a:r>
+              <a:rPr lang="pt-BR" sz="2400" b="1" dirty="0"/>
+              <a:t>MSF</a:t>
+            </a:r>
+            <a:r>
+              <a:rPr lang="pt-BR" sz="2400" dirty="0"/>
+              <a:t> é um dos métodos ágeis mais usados por se destinar ao desenvolvimento de soluções tecnológicas por equipes reduzidas, com foco na diminuição de riscos para o negócio e no aumento da qualidade do produto final.</a:t>
             </a:r>
           </a:p>
           <a:p>
@@ -8354,7 +8777,7 @@
               <a:t>	Dessa forma, assim como o </a:t>
             </a:r>
             <a:r>
-              <a:rPr lang="pt-BR" sz="2400" dirty="0" err="1"/>
+              <a:rPr lang="pt-BR" sz="2400" b="1" dirty="0" err="1"/>
               <a:t>Scrum</a:t>
             </a:r>
             <a:r>
@@ -8528,7 +8951,15 @@
             </a:r>
             <a:r>
               <a:rPr lang="pt-BR" sz="2400" dirty="0"/>
-              <a:t>Assim como os outros métodos ágeis, o MSF também tem melhores práticas que devem ser observadas pela equipe para atingir os níveis de excelência buscados:</a:t>
+              <a:t>Assim como os outros métodos ágeis, o </a:t>
+            </a:r>
+            <a:r>
+              <a:rPr lang="pt-BR" sz="2400" b="1" dirty="0"/>
+              <a:t>MSF</a:t>
+            </a:r>
+            <a:r>
+              <a:rPr lang="pt-BR" sz="2400" dirty="0"/>
+              <a:t> também tem melhores práticas que devem ser observadas pela equipe para atingir os níveis de excelência buscados:</a:t>
             </a:r>
           </a:p>
           <a:p>
@@ -8727,7 +9158,15 @@
             </a:pPr>
             <a:r>
               <a:rPr lang="pt-BR" sz="2000" dirty="0"/>
-              <a:t>	Um tanto diverso dos demais métodos ágeis, ele é destinado ao desenvolvimento de projetos com orçamento fixo e prazos curtos, levando em consideração que o cliente não tem como saber quanto custará a solução final.</a:t>
+              <a:t>	Um tanto diverso dos demais métodos ágeis, ele é destinado ao </a:t>
+            </a:r>
+            <a:r>
+              <a:rPr lang="pt-BR" sz="2000" b="1" dirty="0"/>
+              <a:t>desenvolvimento de projetos com orçamento fixo e prazos curtos</a:t>
+            </a:r>
+            <a:r>
+              <a:rPr lang="pt-BR" sz="2000" dirty="0"/>
+              <a:t>, levando em consideração que o cliente não tem como saber quanto custará a solução final.</a:t>
             </a:r>
           </a:p>
           <a:p>
@@ -8742,7 +9181,15 @@
             </a:pPr>
             <a:r>
               <a:rPr lang="pt-BR" sz="2000" dirty="0"/>
-              <a:t>	Entre as suas melhores práticas estão o desenvolvimento incremental e iterativo, a colaboração entre cliente e equipe, além da integração de funcionalidades, o que também vemos nos demais métodos ágeis.</a:t>
+              <a:t>	Entre as suas melhores práticas estão o </a:t>
+            </a:r>
+            <a:r>
+              <a:rPr lang="pt-BR" sz="2000" b="1" dirty="0"/>
+              <a:t>desenvolvimento incremental e iterativo</a:t>
+            </a:r>
+            <a:r>
+              <a:rPr lang="pt-BR" sz="2000" dirty="0"/>
+              <a:t>, a colaboração entre cliente e equipe, além da integração de funcionalidades, o que também vemos nos demais métodos ágeis.</a:t>
             </a:r>
           </a:p>
           <a:p>
@@ -8757,7 +9204,15 @@
             </a:pPr>
             <a:r>
               <a:rPr lang="pt-BR" sz="2000" dirty="0"/>
-              <a:t>	Vale ressaltar que o DSDM diverge dos demais métodos ágeis tanto em sua estrutura, que é composta por processos interligados de modelagem, concepção, construção e implementação, como na gestão do tempo, que não é flexível, até permitindo que as funcionalidades mudem, mas desde que os prazos de execução continuem os mesmos.</a:t>
+              <a:t>	Vale ressaltar que o </a:t>
+            </a:r>
+            <a:r>
+              <a:rPr lang="pt-BR" sz="2000" b="1" dirty="0"/>
+              <a:t>DSDM</a:t>
+            </a:r>
+            <a:r>
+              <a:rPr lang="pt-BR" sz="2000" dirty="0"/>
+              <a:t> diverge dos demais métodos ágeis tanto em sua estrutura, que é composta por processos interligados de modelagem, concepção, construção e implementação, como na gestão do tempo, que não é flexível, até permitindo que as funcionalidades mudem, mas desde que os prazos de execução continuem os mesmos.</a:t>
             </a:r>
           </a:p>
           <a:p>

</xml_diff>